<commit_message>
welp, the presentation is done, realized that I probably completely screwed myself over so far whilst doing that as well. few minor changes to a few small things here and there, and also I've managed to produce a working .jar artifact version of HECC-UP, which is a good thing I guess.
</commit_message>
<xml_diff>
--- a/Reports n such/Challenge Week Presentation.pptx
+++ b/Reports n such/Challenge Week Presentation.pptx
@@ -4,9 +4,23 @@
   <p:sldMasterIdLst>
     <p:sldMasterId id="2147483648" r:id="rId1"/>
   </p:sldMasterIdLst>
+  <p:notesMasterIdLst>
+    <p:notesMasterId r:id="rId15"/>
+  </p:notesMasterIdLst>
   <p:sldIdLst>
     <p:sldId id="256" r:id="rId2"/>
-    <p:sldId id="257" r:id="rId3"/>
+    <p:sldId id="258" r:id="rId3"/>
+    <p:sldId id="261" r:id="rId4"/>
+    <p:sldId id="262" r:id="rId5"/>
+    <p:sldId id="259" r:id="rId6"/>
+    <p:sldId id="260" r:id="rId7"/>
+    <p:sldId id="263" r:id="rId8"/>
+    <p:sldId id="268" r:id="rId9"/>
+    <p:sldId id="269" r:id="rId10"/>
+    <p:sldId id="264" r:id="rId11"/>
+    <p:sldId id="265" r:id="rId12"/>
+    <p:sldId id="266" r:id="rId13"/>
+    <p:sldId id="267" r:id="rId14"/>
   </p:sldIdLst>
   <p:sldSz cx="12192000" cy="6858000"/>
   <p:notesSz cx="6858000" cy="9144000"/>
@@ -105,13 +119,18 @@
       </a:defRPr>
     </a:lvl9pPr>
   </p:defaultTextStyle>
+  <p:extLst>
+    <p:ext uri="{EFAFB233-063F-42B5-8137-9DF3F51BA10A}">
+      <p15:sldGuideLst xmlns:p15="http://schemas.microsoft.com/office/powerpoint/2012/main"/>
+    </p:ext>
+  </p:extLst>
 </p:presentation>
 </file>
 
 <file path=ppt/revisionInfo.xml><?xml version="1.0" encoding="utf-8"?>
 <p1510:revInfo xmlns:a="http://schemas.openxmlformats.org/drawingml/2006/main" xmlns:r="http://schemas.openxmlformats.org/officeDocument/2006/relationships" xmlns:p1510="http://schemas.microsoft.com/office/powerpoint/2015/10/main">
   <p1510:revLst>
-    <p1510:client id="{551D885F-5087-4AC2-BB60-A6FD85003177}" v="2" dt="2020-10-12T12:23:00.642"/>
+    <p1510:client id="{551D885F-5087-4AC2-BB60-A6FD85003177}" v="133" dt="2020-10-15T16:47:25.117"/>
   </p1510:revLst>
 </p1510:revInfo>
 </file>
@@ -120,19 +139,19 @@
 <pc:chgInfo xmlns:a="http://schemas.openxmlformats.org/drawingml/2006/main" xmlns:r="http://schemas.openxmlformats.org/officeDocument/2006/relationships" xmlns:ac="http://schemas.microsoft.com/office/drawing/2013/main/command" xmlns:pc="http://schemas.microsoft.com/office/powerpoint/2013/main/command">
   <pc:docChgLst>
     <pc:chgData name="Lowe, Richard M" userId="93b75d29-27f6-4dab-b540-bade7f33a1ad" providerId="ADAL" clId="{551D885F-5087-4AC2-BB60-A6FD85003177}"/>
-    <pc:docChg chg="custSel addSld modSld">
-      <pc:chgData name="Lowe, Richard M" userId="93b75d29-27f6-4dab-b540-bade7f33a1ad" providerId="ADAL" clId="{551D885F-5087-4AC2-BB60-A6FD85003177}" dt="2020-10-12T12:33:42.597" v="264" actId="20577"/>
+    <pc:docChg chg="undo custSel addSld delSld modSld">
+      <pc:chgData name="Lowe, Richard M" userId="93b75d29-27f6-4dab-b540-bade7f33a1ad" providerId="ADAL" clId="{551D885F-5087-4AC2-BB60-A6FD85003177}" dt="2020-10-15T16:50:40.820" v="22228" actId="20577"/>
       <pc:docMkLst>
         <pc:docMk/>
       </pc:docMkLst>
       <pc:sldChg chg="modSp add">
-        <pc:chgData name="Lowe, Richard M" userId="93b75d29-27f6-4dab-b540-bade7f33a1ad" providerId="ADAL" clId="{551D885F-5087-4AC2-BB60-A6FD85003177}" dt="2020-10-12T12:18:31.797" v="114" actId="20577"/>
+        <pc:chgData name="Lowe, Richard M" userId="93b75d29-27f6-4dab-b540-bade7f33a1ad" providerId="ADAL" clId="{551D885F-5087-4AC2-BB60-A6FD85003177}" dt="2020-10-15T11:22:06.559" v="358" actId="20577"/>
         <pc:sldMkLst>
           <pc:docMk/>
           <pc:sldMk cId="3782792841" sldId="256"/>
         </pc:sldMkLst>
         <pc:spChg chg="mod">
-          <ac:chgData name="Lowe, Richard M" userId="93b75d29-27f6-4dab-b540-bade7f33a1ad" providerId="ADAL" clId="{551D885F-5087-4AC2-BB60-A6FD85003177}" dt="2020-10-12T12:18:26.157" v="97" actId="20577"/>
+          <ac:chgData name="Lowe, Richard M" userId="93b75d29-27f6-4dab-b540-bade7f33a1ad" providerId="ADAL" clId="{551D885F-5087-4AC2-BB60-A6FD85003177}" dt="2020-10-15T11:22:06.559" v="358" actId="20577"/>
           <ac:spMkLst>
             <pc:docMk/>
             <pc:sldMk cId="3782792841" sldId="256"/>
@@ -148,8 +167,8 @@
           </ac:spMkLst>
         </pc:spChg>
       </pc:sldChg>
-      <pc:sldChg chg="modSp add">
-        <pc:chgData name="Lowe, Richard M" userId="93b75d29-27f6-4dab-b540-bade7f33a1ad" providerId="ADAL" clId="{551D885F-5087-4AC2-BB60-A6FD85003177}" dt="2020-10-12T12:33:42.597" v="264" actId="20577"/>
+      <pc:sldChg chg="modSp add del">
+        <pc:chgData name="Lowe, Richard M" userId="93b75d29-27f6-4dab-b540-bade7f33a1ad" providerId="ADAL" clId="{551D885F-5087-4AC2-BB60-A6FD85003177}" dt="2020-10-15T12:21:12.286" v="2794" actId="2696"/>
         <pc:sldMkLst>
           <pc:docMk/>
           <pc:sldMk cId="1578681135" sldId="257"/>
@@ -171,9 +190,1517 @@
           </ac:spMkLst>
         </pc:spChg>
       </pc:sldChg>
+      <pc:sldChg chg="modSp add">
+        <pc:chgData name="Lowe, Richard M" userId="93b75d29-27f6-4dab-b540-bade7f33a1ad" providerId="ADAL" clId="{551D885F-5087-4AC2-BB60-A6FD85003177}" dt="2020-10-15T16:49:05.638" v="22038" actId="20577"/>
+        <pc:sldMkLst>
+          <pc:docMk/>
+          <pc:sldMk cId="2561028190" sldId="258"/>
+        </pc:sldMkLst>
+        <pc:spChg chg="mod">
+          <ac:chgData name="Lowe, Richard M" userId="93b75d29-27f6-4dab-b540-bade7f33a1ad" providerId="ADAL" clId="{551D885F-5087-4AC2-BB60-A6FD85003177}" dt="2020-10-15T11:30:55.344" v="1135" actId="20577"/>
+          <ac:spMkLst>
+            <pc:docMk/>
+            <pc:sldMk cId="2561028190" sldId="258"/>
+            <ac:spMk id="2" creationId="{2F1E6446-B9A0-4779-8A1F-671B4F654A07}"/>
+          </ac:spMkLst>
+        </pc:spChg>
+        <pc:spChg chg="mod">
+          <ac:chgData name="Lowe, Richard M" userId="93b75d29-27f6-4dab-b540-bade7f33a1ad" providerId="ADAL" clId="{551D885F-5087-4AC2-BB60-A6FD85003177}" dt="2020-10-15T16:49:05.638" v="22038" actId="20577"/>
+          <ac:spMkLst>
+            <pc:docMk/>
+            <pc:sldMk cId="2561028190" sldId="258"/>
+            <ac:spMk id="3" creationId="{9B83323C-3602-44A0-A0F9-0593EAA9BE79}"/>
+          </ac:spMkLst>
+        </pc:spChg>
+      </pc:sldChg>
+      <pc:sldChg chg="modSp add">
+        <pc:chgData name="Lowe, Richard M" userId="93b75d29-27f6-4dab-b540-bade7f33a1ad" providerId="ADAL" clId="{551D885F-5087-4AC2-BB60-A6FD85003177}" dt="2020-10-15T12:52:50.437" v="4927" actId="20577"/>
+        <pc:sldMkLst>
+          <pc:docMk/>
+          <pc:sldMk cId="738980662" sldId="259"/>
+        </pc:sldMkLst>
+        <pc:spChg chg="mod">
+          <ac:chgData name="Lowe, Richard M" userId="93b75d29-27f6-4dab-b540-bade7f33a1ad" providerId="ADAL" clId="{551D885F-5087-4AC2-BB60-A6FD85003177}" dt="2020-10-15T11:31:27.630" v="1165" actId="20577"/>
+          <ac:spMkLst>
+            <pc:docMk/>
+            <pc:sldMk cId="738980662" sldId="259"/>
+            <ac:spMk id="2" creationId="{7822CEE8-C199-485A-ADFC-F49FC10EA06A}"/>
+          </ac:spMkLst>
+        </pc:spChg>
+        <pc:spChg chg="mod">
+          <ac:chgData name="Lowe, Richard M" userId="93b75d29-27f6-4dab-b540-bade7f33a1ad" providerId="ADAL" clId="{551D885F-5087-4AC2-BB60-A6FD85003177}" dt="2020-10-15T12:52:50.437" v="4927" actId="20577"/>
+          <ac:spMkLst>
+            <pc:docMk/>
+            <pc:sldMk cId="738980662" sldId="259"/>
+            <ac:spMk id="3" creationId="{39FCC544-6523-4F92-9C79-BFC971122D25}"/>
+          </ac:spMkLst>
+        </pc:spChg>
+      </pc:sldChg>
+      <pc:sldChg chg="addSp delSp modSp add">
+        <pc:chgData name="Lowe, Richard M" userId="93b75d29-27f6-4dab-b540-bade7f33a1ad" providerId="ADAL" clId="{551D885F-5087-4AC2-BB60-A6FD85003177}" dt="2020-10-15T16:41:22.146" v="21940" actId="20577"/>
+        <pc:sldMkLst>
+          <pc:docMk/>
+          <pc:sldMk cId="2928737561" sldId="260"/>
+        </pc:sldMkLst>
+        <pc:spChg chg="del">
+          <ac:chgData name="Lowe, Richard M" userId="93b75d29-27f6-4dab-b540-bade7f33a1ad" providerId="ADAL" clId="{551D885F-5087-4AC2-BB60-A6FD85003177}" dt="2020-10-15T12:03:54.214" v="2159"/>
+          <ac:spMkLst>
+            <pc:docMk/>
+            <pc:sldMk cId="2928737561" sldId="260"/>
+            <ac:spMk id="2" creationId="{96417A7E-F183-46F7-A162-2498C1B48709}"/>
+          </ac:spMkLst>
+        </pc:spChg>
+        <pc:spChg chg="del mod">
+          <ac:chgData name="Lowe, Richard M" userId="93b75d29-27f6-4dab-b540-bade7f33a1ad" providerId="ADAL" clId="{551D885F-5087-4AC2-BB60-A6FD85003177}" dt="2020-10-15T12:03:54.214" v="2159"/>
+          <ac:spMkLst>
+            <pc:docMk/>
+            <pc:sldMk cId="2928737561" sldId="260"/>
+            <ac:spMk id="3" creationId="{FF3D7898-3B50-475E-971E-0069FA214DB8}"/>
+          </ac:spMkLst>
+        </pc:spChg>
+        <pc:spChg chg="del mod">
+          <ac:chgData name="Lowe, Richard M" userId="93b75d29-27f6-4dab-b540-bade7f33a1ad" providerId="ADAL" clId="{551D885F-5087-4AC2-BB60-A6FD85003177}" dt="2020-10-15T12:03:54.214" v="2159"/>
+          <ac:spMkLst>
+            <pc:docMk/>
+            <pc:sldMk cId="2928737561" sldId="260"/>
+            <ac:spMk id="4" creationId="{88A32978-5C70-49CB-AFF4-AA2D9A2BC08A}"/>
+          </ac:spMkLst>
+        </pc:spChg>
+        <pc:spChg chg="del mod">
+          <ac:chgData name="Lowe, Richard M" userId="93b75d29-27f6-4dab-b540-bade7f33a1ad" providerId="ADAL" clId="{551D885F-5087-4AC2-BB60-A6FD85003177}" dt="2020-10-15T12:03:54.214" v="2159"/>
+          <ac:spMkLst>
+            <pc:docMk/>
+            <pc:sldMk cId="2928737561" sldId="260"/>
+            <ac:spMk id="5" creationId="{DBCFD8D6-D905-4145-9794-831BF127AC90}"/>
+          </ac:spMkLst>
+        </pc:spChg>
+        <pc:spChg chg="del mod">
+          <ac:chgData name="Lowe, Richard M" userId="93b75d29-27f6-4dab-b540-bade7f33a1ad" providerId="ADAL" clId="{551D885F-5087-4AC2-BB60-A6FD85003177}" dt="2020-10-15T12:03:54.214" v="2159"/>
+          <ac:spMkLst>
+            <pc:docMk/>
+            <pc:sldMk cId="2928737561" sldId="260"/>
+            <ac:spMk id="6" creationId="{C0454D5B-014A-455E-B2DE-29F59B8E75F4}"/>
+          </ac:spMkLst>
+        </pc:spChg>
+        <pc:spChg chg="add del">
+          <ac:chgData name="Lowe, Richard M" userId="93b75d29-27f6-4dab-b540-bade7f33a1ad" providerId="ADAL" clId="{551D885F-5087-4AC2-BB60-A6FD85003177}" dt="2020-10-15T12:01:33.045" v="2123"/>
+          <ac:spMkLst>
+            <pc:docMk/>
+            <pc:sldMk cId="2928737561" sldId="260"/>
+            <ac:spMk id="7" creationId="{0816FCC9-5371-44D0-82B6-5C9917A6C1D2}"/>
+          </ac:spMkLst>
+        </pc:spChg>
+        <pc:spChg chg="add mod">
+          <ac:chgData name="Lowe, Richard M" userId="93b75d29-27f6-4dab-b540-bade7f33a1ad" providerId="ADAL" clId="{551D885F-5087-4AC2-BB60-A6FD85003177}" dt="2020-10-15T16:41:05.650" v="21929" actId="20577"/>
+          <ac:spMkLst>
+            <pc:docMk/>
+            <pc:sldMk cId="2928737561" sldId="260"/>
+            <ac:spMk id="8" creationId="{9878DE24-842E-4F83-8563-9997359D143E}"/>
+          </ac:spMkLst>
+        </pc:spChg>
+        <pc:spChg chg="add del mod">
+          <ac:chgData name="Lowe, Richard M" userId="93b75d29-27f6-4dab-b540-bade7f33a1ad" providerId="ADAL" clId="{551D885F-5087-4AC2-BB60-A6FD85003177}" dt="2020-10-15T12:03:59.220" v="2160"/>
+          <ac:spMkLst>
+            <pc:docMk/>
+            <pc:sldMk cId="2928737561" sldId="260"/>
+            <ac:spMk id="9" creationId="{5E20780D-F101-4824-82C3-15D4C4B9B53E}"/>
+          </ac:spMkLst>
+        </pc:spChg>
+        <pc:spChg chg="add del mod">
+          <ac:chgData name="Lowe, Richard M" userId="93b75d29-27f6-4dab-b540-bade7f33a1ad" providerId="ADAL" clId="{551D885F-5087-4AC2-BB60-A6FD85003177}" dt="2020-10-15T12:03:59.220" v="2160"/>
+          <ac:spMkLst>
+            <pc:docMk/>
+            <pc:sldMk cId="2928737561" sldId="260"/>
+            <ac:spMk id="10" creationId="{4A41240D-1AA6-460F-9D1D-64213A28C5E2}"/>
+          </ac:spMkLst>
+        </pc:spChg>
+        <pc:spChg chg="add del mod">
+          <ac:chgData name="Lowe, Richard M" userId="93b75d29-27f6-4dab-b540-bade7f33a1ad" providerId="ADAL" clId="{551D885F-5087-4AC2-BB60-A6FD85003177}" dt="2020-10-15T12:03:59.220" v="2160"/>
+          <ac:spMkLst>
+            <pc:docMk/>
+            <pc:sldMk cId="2928737561" sldId="260"/>
+            <ac:spMk id="11" creationId="{471F0067-5A94-4518-B898-DF3562AA624A}"/>
+          </ac:spMkLst>
+        </pc:spChg>
+        <pc:spChg chg="add del mod">
+          <ac:chgData name="Lowe, Richard M" userId="93b75d29-27f6-4dab-b540-bade7f33a1ad" providerId="ADAL" clId="{551D885F-5087-4AC2-BB60-A6FD85003177}" dt="2020-10-15T12:03:59.220" v="2160"/>
+          <ac:spMkLst>
+            <pc:docMk/>
+            <pc:sldMk cId="2928737561" sldId="260"/>
+            <ac:spMk id="12" creationId="{8F1AB70F-A3FA-492E-B828-DD4803E4A8AE}"/>
+          </ac:spMkLst>
+        </pc:spChg>
+        <pc:spChg chg="add del mod">
+          <ac:chgData name="Lowe, Richard M" userId="93b75d29-27f6-4dab-b540-bade7f33a1ad" providerId="ADAL" clId="{551D885F-5087-4AC2-BB60-A6FD85003177}" dt="2020-10-15T12:03:59.220" v="2160"/>
+          <ac:spMkLst>
+            <pc:docMk/>
+            <pc:sldMk cId="2928737561" sldId="260"/>
+            <ac:spMk id="13" creationId="{841591AC-50D0-4D71-8AEC-FA86311250FE}"/>
+          </ac:spMkLst>
+        </pc:spChg>
+        <pc:spChg chg="add del mod">
+          <ac:chgData name="Lowe, Richard M" userId="93b75d29-27f6-4dab-b540-bade7f33a1ad" providerId="ADAL" clId="{551D885F-5087-4AC2-BB60-A6FD85003177}" dt="2020-10-15T12:08:25.832" v="2218" actId="478"/>
+          <ac:spMkLst>
+            <pc:docMk/>
+            <pc:sldMk cId="2928737561" sldId="260"/>
+            <ac:spMk id="14" creationId="{D127119D-630F-434C-B59C-F37D40A59403}"/>
+          </ac:spMkLst>
+        </pc:spChg>
+        <pc:spChg chg="add mod">
+          <ac:chgData name="Lowe, Richard M" userId="93b75d29-27f6-4dab-b540-bade7f33a1ad" providerId="ADAL" clId="{551D885F-5087-4AC2-BB60-A6FD85003177}" dt="2020-10-15T16:39:58.276" v="21800" actId="27636"/>
+          <ac:spMkLst>
+            <pc:docMk/>
+            <pc:sldMk cId="2928737561" sldId="260"/>
+            <ac:spMk id="15" creationId="{723C954C-CDEC-47B1-BD57-0B08DF27E63F}"/>
+          </ac:spMkLst>
+        </pc:spChg>
+        <pc:spChg chg="add mod">
+          <ac:chgData name="Lowe, Richard M" userId="93b75d29-27f6-4dab-b540-bade7f33a1ad" providerId="ADAL" clId="{551D885F-5087-4AC2-BB60-A6FD85003177}" dt="2020-10-15T16:41:19.153" v="21932" actId="14100"/>
+          <ac:spMkLst>
+            <pc:docMk/>
+            <pc:sldMk cId="2928737561" sldId="260"/>
+            <ac:spMk id="16" creationId="{FC85EC69-24F2-4A9C-AF42-79B6E029B681}"/>
+          </ac:spMkLst>
+        </pc:spChg>
+        <pc:spChg chg="add mod">
+          <ac:chgData name="Lowe, Richard M" userId="93b75d29-27f6-4dab-b540-bade7f33a1ad" providerId="ADAL" clId="{551D885F-5087-4AC2-BB60-A6FD85003177}" dt="2020-10-15T16:39:58.276" v="21799" actId="27636"/>
+          <ac:spMkLst>
+            <pc:docMk/>
+            <pc:sldMk cId="2928737561" sldId="260"/>
+            <ac:spMk id="17" creationId="{A7C7FAB9-4CFD-4651-B2E8-C0B1B632D3F3}"/>
+          </ac:spMkLst>
+        </pc:spChg>
+        <pc:spChg chg="add mod">
+          <ac:chgData name="Lowe, Richard M" userId="93b75d29-27f6-4dab-b540-bade7f33a1ad" providerId="ADAL" clId="{551D885F-5087-4AC2-BB60-A6FD85003177}" dt="2020-10-15T16:41:22.146" v="21940" actId="20577"/>
+          <ac:spMkLst>
+            <pc:docMk/>
+            <pc:sldMk cId="2928737561" sldId="260"/>
+            <ac:spMk id="18" creationId="{A11B7E63-284A-45E6-9671-CA2FBCD2EFBC}"/>
+          </ac:spMkLst>
+        </pc:spChg>
+        <pc:spChg chg="add mod">
+          <ac:chgData name="Lowe, Richard M" userId="93b75d29-27f6-4dab-b540-bade7f33a1ad" providerId="ADAL" clId="{551D885F-5087-4AC2-BB60-A6FD85003177}" dt="2020-10-15T16:39:50.755" v="21796" actId="20577"/>
+          <ac:spMkLst>
+            <pc:docMk/>
+            <pc:sldMk cId="2928737561" sldId="260"/>
+            <ac:spMk id="19" creationId="{46CA8F74-A661-47BA-AFDF-DC576A50E49B}"/>
+          </ac:spMkLst>
+        </pc:spChg>
+      </pc:sldChg>
+      <pc:sldChg chg="modSp add modNotesTx">
+        <pc:chgData name="Lowe, Richard M" userId="93b75d29-27f6-4dab-b540-bade7f33a1ad" providerId="ADAL" clId="{551D885F-5087-4AC2-BB60-A6FD85003177}" dt="2020-10-15T16:49:26.265" v="22073" actId="20577"/>
+        <pc:sldMkLst>
+          <pc:docMk/>
+          <pc:sldMk cId="2596281665" sldId="261"/>
+        </pc:sldMkLst>
+        <pc:spChg chg="mod">
+          <ac:chgData name="Lowe, Richard M" userId="93b75d29-27f6-4dab-b540-bade7f33a1ad" providerId="ADAL" clId="{551D885F-5087-4AC2-BB60-A6FD85003177}" dt="2020-10-15T12:21:55.943" v="2870" actId="20577"/>
+          <ac:spMkLst>
+            <pc:docMk/>
+            <pc:sldMk cId="2596281665" sldId="261"/>
+            <ac:spMk id="2" creationId="{ACE0EAC1-F1BB-4C4D-9B15-66CF5A15E613}"/>
+          </ac:spMkLst>
+        </pc:spChg>
+        <pc:spChg chg="mod">
+          <ac:chgData name="Lowe, Richard M" userId="93b75d29-27f6-4dab-b540-bade7f33a1ad" providerId="ADAL" clId="{551D885F-5087-4AC2-BB60-A6FD85003177}" dt="2020-10-15T12:33:17.018" v="4665" actId="20577"/>
+          <ac:spMkLst>
+            <pc:docMk/>
+            <pc:sldMk cId="2596281665" sldId="261"/>
+            <ac:spMk id="3" creationId="{ED233C0A-28BB-44C4-A03A-A172AC23001B}"/>
+          </ac:spMkLst>
+        </pc:spChg>
+      </pc:sldChg>
+      <pc:sldChg chg="addSp delSp modSp add">
+        <pc:chgData name="Lowe, Richard M" userId="93b75d29-27f6-4dab-b540-bade7f33a1ad" providerId="ADAL" clId="{551D885F-5087-4AC2-BB60-A6FD85003177}" dt="2020-10-15T12:34:53.962" v="4702" actId="1076"/>
+        <pc:sldMkLst>
+          <pc:docMk/>
+          <pc:sldMk cId="3927840763" sldId="262"/>
+        </pc:sldMkLst>
+        <pc:spChg chg="del mod">
+          <ac:chgData name="Lowe, Richard M" userId="93b75d29-27f6-4dab-b540-bade7f33a1ad" providerId="ADAL" clId="{551D885F-5087-4AC2-BB60-A6FD85003177}" dt="2020-10-15T12:34:43.202" v="4699" actId="478"/>
+          <ac:spMkLst>
+            <pc:docMk/>
+            <pc:sldMk cId="3927840763" sldId="262"/>
+            <ac:spMk id="2" creationId="{863AE9CA-1D65-4114-9C2B-AA0A91DB1165}"/>
+          </ac:spMkLst>
+        </pc:spChg>
+        <pc:spChg chg="del">
+          <ac:chgData name="Lowe, Richard M" userId="93b75d29-27f6-4dab-b540-bade7f33a1ad" providerId="ADAL" clId="{551D885F-5087-4AC2-BB60-A6FD85003177}" dt="2020-10-15T12:33:38.254" v="4667"/>
+          <ac:spMkLst>
+            <pc:docMk/>
+            <pc:sldMk cId="3927840763" sldId="262"/>
+            <ac:spMk id="3" creationId="{1F2FF325-FFF0-4058-8A42-B01B48819596}"/>
+          </ac:spMkLst>
+        </pc:spChg>
+        <pc:spChg chg="add del mod">
+          <ac:chgData name="Lowe, Richard M" userId="93b75d29-27f6-4dab-b540-bade7f33a1ad" providerId="ADAL" clId="{551D885F-5087-4AC2-BB60-A6FD85003177}" dt="2020-10-15T12:34:44.911" v="4700" actId="478"/>
+          <ac:spMkLst>
+            <pc:docMk/>
+            <pc:sldMk cId="3927840763" sldId="262"/>
+            <ac:spMk id="7" creationId="{2E70C2CD-B4E1-4FB6-83BE-6740250CDFF5}"/>
+          </ac:spMkLst>
+        </pc:spChg>
+        <pc:picChg chg="add mod">
+          <ac:chgData name="Lowe, Richard M" userId="93b75d29-27f6-4dab-b540-bade7f33a1ad" providerId="ADAL" clId="{551D885F-5087-4AC2-BB60-A6FD85003177}" dt="2020-10-15T12:34:53.962" v="4702" actId="1076"/>
+          <ac:picMkLst>
+            <pc:docMk/>
+            <pc:sldMk cId="3927840763" sldId="262"/>
+            <ac:picMk id="5" creationId="{1543EBC8-C28E-4AE4-BA62-C21FE2CB5D18}"/>
+          </ac:picMkLst>
+        </pc:picChg>
+      </pc:sldChg>
+      <pc:sldChg chg="modSp add">
+        <pc:chgData name="Lowe, Richard M" userId="93b75d29-27f6-4dab-b540-bade7f33a1ad" providerId="ADAL" clId="{551D885F-5087-4AC2-BB60-A6FD85003177}" dt="2020-10-15T13:41:35.127" v="7403" actId="20577"/>
+        <pc:sldMkLst>
+          <pc:docMk/>
+          <pc:sldMk cId="800657811" sldId="263"/>
+        </pc:sldMkLst>
+        <pc:spChg chg="mod">
+          <ac:chgData name="Lowe, Richard M" userId="93b75d29-27f6-4dab-b540-bade7f33a1ad" providerId="ADAL" clId="{551D885F-5087-4AC2-BB60-A6FD85003177}" dt="2020-10-15T13:41:35.127" v="7403" actId="20577"/>
+          <ac:spMkLst>
+            <pc:docMk/>
+            <pc:sldMk cId="800657811" sldId="263"/>
+            <ac:spMk id="2" creationId="{3057F0C6-F80A-4F5F-AB7C-4F9F5D0D25F8}"/>
+          </ac:spMkLst>
+        </pc:spChg>
+        <pc:spChg chg="mod">
+          <ac:chgData name="Lowe, Richard M" userId="93b75d29-27f6-4dab-b540-bade7f33a1ad" providerId="ADAL" clId="{551D885F-5087-4AC2-BB60-A6FD85003177}" dt="2020-10-15T13:36:15.336" v="7214" actId="20577"/>
+          <ac:spMkLst>
+            <pc:docMk/>
+            <pc:sldMk cId="800657811" sldId="263"/>
+            <ac:spMk id="3" creationId="{38759F59-42AA-404B-89FA-97AB73B333B1}"/>
+          </ac:spMkLst>
+        </pc:spChg>
+      </pc:sldChg>
+      <pc:sldChg chg="add del">
+        <pc:chgData name="Lowe, Richard M" userId="93b75d29-27f6-4dab-b540-bade7f33a1ad" providerId="ADAL" clId="{551D885F-5087-4AC2-BB60-A6FD85003177}" dt="2020-10-15T12:35:34.681" v="4704" actId="2696"/>
+        <pc:sldMkLst>
+          <pc:docMk/>
+          <pc:sldMk cId="1454513211" sldId="263"/>
+        </pc:sldMkLst>
+      </pc:sldChg>
+      <pc:sldChg chg="modSp add modNotesTx">
+        <pc:chgData name="Lowe, Richard M" userId="93b75d29-27f6-4dab-b540-bade7f33a1ad" providerId="ADAL" clId="{551D885F-5087-4AC2-BB60-A6FD85003177}" dt="2020-10-15T15:46:33.416" v="13343" actId="20577"/>
+        <pc:sldMkLst>
+          <pc:docMk/>
+          <pc:sldMk cId="2174968697" sldId="264"/>
+        </pc:sldMkLst>
+        <pc:spChg chg="mod">
+          <ac:chgData name="Lowe, Richard M" userId="93b75d29-27f6-4dab-b540-bade7f33a1ad" providerId="ADAL" clId="{551D885F-5087-4AC2-BB60-A6FD85003177}" dt="2020-10-15T12:45:55.096" v="4741" actId="20577"/>
+          <ac:spMkLst>
+            <pc:docMk/>
+            <pc:sldMk cId="2174968697" sldId="264"/>
+            <ac:spMk id="2" creationId="{B5D2829E-2ACA-4037-916C-50054A9342C3}"/>
+          </ac:spMkLst>
+        </pc:spChg>
+        <pc:spChg chg="mod">
+          <ac:chgData name="Lowe, Richard M" userId="93b75d29-27f6-4dab-b540-bade7f33a1ad" providerId="ADAL" clId="{551D885F-5087-4AC2-BB60-A6FD85003177}" dt="2020-10-15T15:46:33.416" v="13343" actId="20577"/>
+          <ac:spMkLst>
+            <pc:docMk/>
+            <pc:sldMk cId="2174968697" sldId="264"/>
+            <ac:spMk id="3" creationId="{D6CE67FD-BAE5-4A0B-B83A-325919DA02A2}"/>
+          </ac:spMkLst>
+        </pc:spChg>
+      </pc:sldChg>
+      <pc:sldChg chg="modSp add">
+        <pc:chgData name="Lowe, Richard M" userId="93b75d29-27f6-4dab-b540-bade7f33a1ad" providerId="ADAL" clId="{551D885F-5087-4AC2-BB60-A6FD85003177}" dt="2020-10-15T16:00:57.244" v="16290" actId="20577"/>
+        <pc:sldMkLst>
+          <pc:docMk/>
+          <pc:sldMk cId="2127064633" sldId="265"/>
+        </pc:sldMkLst>
+        <pc:spChg chg="mod">
+          <ac:chgData name="Lowe, Richard M" userId="93b75d29-27f6-4dab-b540-bade7f33a1ad" providerId="ADAL" clId="{551D885F-5087-4AC2-BB60-A6FD85003177}" dt="2020-10-15T12:50:49.119" v="4757" actId="20577"/>
+          <ac:spMkLst>
+            <pc:docMk/>
+            <pc:sldMk cId="2127064633" sldId="265"/>
+            <ac:spMk id="2" creationId="{164CCB97-A2C3-46A1-B963-05843F1CD803}"/>
+          </ac:spMkLst>
+        </pc:spChg>
+        <pc:spChg chg="mod">
+          <ac:chgData name="Lowe, Richard M" userId="93b75d29-27f6-4dab-b540-bade7f33a1ad" providerId="ADAL" clId="{551D885F-5087-4AC2-BB60-A6FD85003177}" dt="2020-10-15T16:00:57.244" v="16290" actId="20577"/>
+          <ac:spMkLst>
+            <pc:docMk/>
+            <pc:sldMk cId="2127064633" sldId="265"/>
+            <ac:spMk id="3" creationId="{ED484593-B512-4BCE-A40B-1D3ED19A4261}"/>
+          </ac:spMkLst>
+        </pc:spChg>
+      </pc:sldChg>
+      <pc:sldChg chg="modSp add">
+        <pc:chgData name="Lowe, Richard M" userId="93b75d29-27f6-4dab-b540-bade7f33a1ad" providerId="ADAL" clId="{551D885F-5087-4AC2-BB60-A6FD85003177}" dt="2020-10-15T16:15:20.482" v="17730" actId="20577"/>
+        <pc:sldMkLst>
+          <pc:docMk/>
+          <pc:sldMk cId="70301375" sldId="266"/>
+        </pc:sldMkLst>
+        <pc:spChg chg="mod">
+          <ac:chgData name="Lowe, Richard M" userId="93b75d29-27f6-4dab-b540-bade7f33a1ad" providerId="ADAL" clId="{551D885F-5087-4AC2-BB60-A6FD85003177}" dt="2020-10-15T12:51:09.063" v="4796" actId="20577"/>
+          <ac:spMkLst>
+            <pc:docMk/>
+            <pc:sldMk cId="70301375" sldId="266"/>
+            <ac:spMk id="2" creationId="{79DA0852-1CA8-400D-9948-D178400F4973}"/>
+          </ac:spMkLst>
+        </pc:spChg>
+        <pc:spChg chg="mod">
+          <ac:chgData name="Lowe, Richard M" userId="93b75d29-27f6-4dab-b540-bade7f33a1ad" providerId="ADAL" clId="{551D885F-5087-4AC2-BB60-A6FD85003177}" dt="2020-10-15T16:15:20.482" v="17730" actId="20577"/>
+          <ac:spMkLst>
+            <pc:docMk/>
+            <pc:sldMk cId="70301375" sldId="266"/>
+            <ac:spMk id="3" creationId="{1FECDC8A-89B2-4DC5-83F5-8EEA42E0375E}"/>
+          </ac:spMkLst>
+        </pc:spChg>
+      </pc:sldChg>
+      <pc:sldChg chg="modSp add modNotesTx">
+        <pc:chgData name="Lowe, Richard M" userId="93b75d29-27f6-4dab-b540-bade7f33a1ad" providerId="ADAL" clId="{551D885F-5087-4AC2-BB60-A6FD85003177}" dt="2020-10-15T16:23:27.209" v="18846" actId="20577"/>
+        <pc:sldMkLst>
+          <pc:docMk/>
+          <pc:sldMk cId="2588597299" sldId="267"/>
+        </pc:sldMkLst>
+        <pc:spChg chg="mod">
+          <ac:chgData name="Lowe, Richard M" userId="93b75d29-27f6-4dab-b540-bade7f33a1ad" providerId="ADAL" clId="{551D885F-5087-4AC2-BB60-A6FD85003177}" dt="2020-10-15T12:51:15.190" v="4810" actId="20577"/>
+          <ac:spMkLst>
+            <pc:docMk/>
+            <pc:sldMk cId="2588597299" sldId="267"/>
+            <ac:spMk id="2" creationId="{11AB9975-6791-4ECB-B592-A52514262655}"/>
+          </ac:spMkLst>
+        </pc:spChg>
+        <pc:spChg chg="mod">
+          <ac:chgData name="Lowe, Richard M" userId="93b75d29-27f6-4dab-b540-bade7f33a1ad" providerId="ADAL" clId="{551D885F-5087-4AC2-BB60-A6FD85003177}" dt="2020-10-15T16:23:27.209" v="18846" actId="20577"/>
+          <ac:spMkLst>
+            <pc:docMk/>
+            <pc:sldMk cId="2588597299" sldId="267"/>
+            <ac:spMk id="3" creationId="{E2E77E14-B7A2-4CE5-984C-907BD637A4B1}"/>
+          </ac:spMkLst>
+        </pc:spChg>
+      </pc:sldChg>
+      <pc:sldChg chg="modSp add del">
+        <pc:chgData name="Lowe, Richard M" userId="93b75d29-27f6-4dab-b540-bade7f33a1ad" providerId="ADAL" clId="{551D885F-5087-4AC2-BB60-A6FD85003177}" dt="2020-10-15T12:53:32.232" v="4935" actId="2696"/>
+        <pc:sldMkLst>
+          <pc:docMk/>
+          <pc:sldMk cId="697665087" sldId="268"/>
+        </pc:sldMkLst>
+        <pc:spChg chg="mod">
+          <ac:chgData name="Lowe, Richard M" userId="93b75d29-27f6-4dab-b540-bade7f33a1ad" providerId="ADAL" clId="{551D885F-5087-4AC2-BB60-A6FD85003177}" dt="2020-10-15T12:53:22.451" v="4934" actId="20577"/>
+          <ac:spMkLst>
+            <pc:docMk/>
+            <pc:sldMk cId="697665087" sldId="268"/>
+            <ac:spMk id="2" creationId="{22843AB9-F6A6-4A90-BA2B-A02D5C2FCC56}"/>
+          </ac:spMkLst>
+        </pc:spChg>
+      </pc:sldChg>
+      <pc:sldChg chg="modSp add modAnim modNotesTx">
+        <pc:chgData name="Lowe, Richard M" userId="93b75d29-27f6-4dab-b540-bade7f33a1ad" providerId="ADAL" clId="{551D885F-5087-4AC2-BB60-A6FD85003177}" dt="2020-10-15T16:50:10.081" v="22149" actId="20577"/>
+        <pc:sldMkLst>
+          <pc:docMk/>
+          <pc:sldMk cId="1793798098" sldId="268"/>
+        </pc:sldMkLst>
+        <pc:spChg chg="mod">
+          <ac:chgData name="Lowe, Richard M" userId="93b75d29-27f6-4dab-b540-bade7f33a1ad" providerId="ADAL" clId="{551D885F-5087-4AC2-BB60-A6FD85003177}" dt="2020-10-15T13:41:49.209" v="7444" actId="20577"/>
+          <ac:spMkLst>
+            <pc:docMk/>
+            <pc:sldMk cId="1793798098" sldId="268"/>
+            <ac:spMk id="2" creationId="{D97A06FC-D6A8-4ACA-B0C3-4A61D4827272}"/>
+          </ac:spMkLst>
+        </pc:spChg>
+        <pc:spChg chg="mod">
+          <ac:chgData name="Lowe, Richard M" userId="93b75d29-27f6-4dab-b540-bade7f33a1ad" providerId="ADAL" clId="{551D885F-5087-4AC2-BB60-A6FD85003177}" dt="2020-10-15T13:41:14.479" v="7367" actId="20577"/>
+          <ac:spMkLst>
+            <pc:docMk/>
+            <pc:sldMk cId="1793798098" sldId="268"/>
+            <ac:spMk id="3" creationId="{DC8AF8D4-9234-41EC-85F8-F216B1F5C90D}"/>
+          </ac:spMkLst>
+        </pc:spChg>
+        <pc:spChg chg="mod">
+          <ac:chgData name="Lowe, Richard M" userId="93b75d29-27f6-4dab-b540-bade7f33a1ad" providerId="ADAL" clId="{551D885F-5087-4AC2-BB60-A6FD85003177}" dt="2020-10-15T13:52:37.172" v="7487" actId="20577"/>
+          <ac:spMkLst>
+            <pc:docMk/>
+            <pc:sldMk cId="1793798098" sldId="268"/>
+            <ac:spMk id="4" creationId="{2625298C-F16D-4A3E-A134-54124E08BB39}"/>
+          </ac:spMkLst>
+        </pc:spChg>
+        <pc:spChg chg="mod">
+          <ac:chgData name="Lowe, Richard M" userId="93b75d29-27f6-4dab-b540-bade7f33a1ad" providerId="ADAL" clId="{551D885F-5087-4AC2-BB60-A6FD85003177}" dt="2020-10-15T13:36:45.080" v="7258" actId="20577"/>
+          <ac:spMkLst>
+            <pc:docMk/>
+            <pc:sldMk cId="1793798098" sldId="268"/>
+            <ac:spMk id="5" creationId="{97EE74CC-84A9-43A0-B0CF-A6F21EE86027}"/>
+          </ac:spMkLst>
+        </pc:spChg>
+        <pc:spChg chg="mod">
+          <ac:chgData name="Lowe, Richard M" userId="93b75d29-27f6-4dab-b540-bade7f33a1ad" providerId="ADAL" clId="{551D885F-5087-4AC2-BB60-A6FD85003177}" dt="2020-10-15T16:50:10.081" v="22149" actId="20577"/>
+          <ac:spMkLst>
+            <pc:docMk/>
+            <pc:sldMk cId="1793798098" sldId="268"/>
+            <ac:spMk id="6" creationId="{B5129500-A132-4E3A-94B1-CC555335A7E3}"/>
+          </ac:spMkLst>
+        </pc:spChg>
+      </pc:sldChg>
+      <pc:sldChg chg="modSp add del">
+        <pc:chgData name="Lowe, Richard M" userId="93b75d29-27f6-4dab-b540-bade7f33a1ad" providerId="ADAL" clId="{551D885F-5087-4AC2-BB60-A6FD85003177}" dt="2020-10-15T13:35:42.776" v="7189" actId="2696"/>
+        <pc:sldMkLst>
+          <pc:docMk/>
+          <pc:sldMk cId="2925855673" sldId="268"/>
+        </pc:sldMkLst>
+        <pc:spChg chg="mod">
+          <ac:chgData name="Lowe, Richard M" userId="93b75d29-27f6-4dab-b540-bade7f33a1ad" providerId="ADAL" clId="{551D885F-5087-4AC2-BB60-A6FD85003177}" dt="2020-10-15T12:54:04.174" v="4986" actId="20577"/>
+          <ac:spMkLst>
+            <pc:docMk/>
+            <pc:sldMk cId="2925855673" sldId="268"/>
+            <ac:spMk id="2" creationId="{FBF3513A-FF1F-4A98-8767-A351F85774FE}"/>
+          </ac:spMkLst>
+        </pc:spChg>
+        <pc:spChg chg="mod">
+          <ac:chgData name="Lowe, Richard M" userId="93b75d29-27f6-4dab-b540-bade7f33a1ad" providerId="ADAL" clId="{551D885F-5087-4AC2-BB60-A6FD85003177}" dt="2020-10-15T13:35:38.731" v="7188" actId="20577"/>
+          <ac:spMkLst>
+            <pc:docMk/>
+            <pc:sldMk cId="2925855673" sldId="268"/>
+            <ac:spMk id="3" creationId="{F96609FC-A646-4A24-A2CE-DB6629FD4BF2}"/>
+          </ac:spMkLst>
+        </pc:spChg>
+      </pc:sldChg>
+      <pc:sldChg chg="addSp delSp modSp add modNotesTx">
+        <pc:chgData name="Lowe, Richard M" userId="93b75d29-27f6-4dab-b540-bade7f33a1ad" providerId="ADAL" clId="{551D885F-5087-4AC2-BB60-A6FD85003177}" dt="2020-10-15T16:50:40.820" v="22228" actId="20577"/>
+        <pc:sldMkLst>
+          <pc:docMk/>
+          <pc:sldMk cId="878860589" sldId="269"/>
+        </pc:sldMkLst>
+        <pc:spChg chg="mod">
+          <ac:chgData name="Lowe, Richard M" userId="93b75d29-27f6-4dab-b540-bade7f33a1ad" providerId="ADAL" clId="{551D885F-5087-4AC2-BB60-A6FD85003177}" dt="2020-10-15T14:45:50.817" v="10609" actId="1076"/>
+          <ac:spMkLst>
+            <pc:docMk/>
+            <pc:sldMk cId="878860589" sldId="269"/>
+            <ac:spMk id="2" creationId="{2DA6C680-EB60-4F90-B0F4-9B09B87678DF}"/>
+          </ac:spMkLst>
+        </pc:spChg>
+        <pc:spChg chg="del">
+          <ac:chgData name="Lowe, Richard M" userId="93b75d29-27f6-4dab-b540-bade7f33a1ad" providerId="ADAL" clId="{551D885F-5087-4AC2-BB60-A6FD85003177}" dt="2020-10-15T14:45:53.271" v="10610" actId="478"/>
+          <ac:spMkLst>
+            <pc:docMk/>
+            <pc:sldMk cId="878860589" sldId="269"/>
+            <ac:spMk id="3" creationId="{52F4F43F-A704-4B78-B90D-4134742C41C5}"/>
+          </ac:spMkLst>
+        </pc:spChg>
+        <pc:picChg chg="add mod">
+          <ac:chgData name="Lowe, Richard M" userId="93b75d29-27f6-4dab-b540-bade7f33a1ad" providerId="ADAL" clId="{551D885F-5087-4AC2-BB60-A6FD85003177}" dt="2020-10-15T14:46:06.550" v="10613" actId="1076"/>
+          <ac:picMkLst>
+            <pc:docMk/>
+            <pc:sldMk cId="878860589" sldId="269"/>
+            <ac:picMk id="4" creationId="{42C6B127-7E90-470C-82C9-4F08F102787A}"/>
+          </ac:picMkLst>
+        </pc:picChg>
+      </pc:sldChg>
+      <pc:sldChg chg="add del">
+        <pc:chgData name="Lowe, Richard M" userId="93b75d29-27f6-4dab-b540-bade7f33a1ad" providerId="ADAL" clId="{551D885F-5087-4AC2-BB60-A6FD85003177}" dt="2020-10-15T14:35:07.561" v="10562" actId="2696"/>
+        <pc:sldMkLst>
+          <pc:docMk/>
+          <pc:sldMk cId="1980781776" sldId="269"/>
+        </pc:sldMkLst>
+      </pc:sldChg>
+      <pc:sldChg chg="modSp add del">
+        <pc:chgData name="Lowe, Richard M" userId="93b75d29-27f6-4dab-b540-bade7f33a1ad" providerId="ADAL" clId="{551D885F-5087-4AC2-BB60-A6FD85003177}" dt="2020-10-15T16:48:36.603" v="21988" actId="2696"/>
+        <pc:sldMkLst>
+          <pc:docMk/>
+          <pc:sldMk cId="1203244414" sldId="270"/>
+        </pc:sldMkLst>
+        <pc:spChg chg="mod">
+          <ac:chgData name="Lowe, Richard M" userId="93b75d29-27f6-4dab-b540-bade7f33a1ad" providerId="ADAL" clId="{551D885F-5087-4AC2-BB60-A6FD85003177}" dt="2020-10-15T16:48:16.866" v="21987" actId="20577"/>
+          <ac:spMkLst>
+            <pc:docMk/>
+            <pc:sldMk cId="1203244414" sldId="270"/>
+            <ac:spMk id="2" creationId="{08B085F4-A01D-41C8-A53D-4F5C4FC5E683}"/>
+          </ac:spMkLst>
+        </pc:spChg>
+      </pc:sldChg>
     </pc:docChg>
   </pc:docChgLst>
 </pc:chgInfo>
+</file>
+
+<file path=ppt/notesMasters/notesMaster1.xml><?xml version="1.0" encoding="utf-8"?>
+<p:notesMaster xmlns:a="http://schemas.openxmlformats.org/drawingml/2006/main" xmlns:r="http://schemas.openxmlformats.org/officeDocument/2006/relationships" xmlns:p="http://schemas.openxmlformats.org/presentationml/2006/main">
+  <p:cSld>
+    <p:bg>
+      <p:bgRef idx="1001">
+        <a:schemeClr val="bg1"/>
+      </p:bgRef>
+    </p:bg>
+    <p:spTree>
+      <p:nvGrpSpPr>
+        <p:cNvPr id="1" name=""/>
+        <p:cNvGrpSpPr/>
+        <p:nvPr/>
+      </p:nvGrpSpPr>
+      <p:grpSpPr>
+        <a:xfrm>
+          <a:off x="0" y="0"/>
+          <a:ext cx="0" cy="0"/>
+          <a:chOff x="0" y="0"/>
+          <a:chExt cx="0" cy="0"/>
+        </a:xfrm>
+      </p:grpSpPr>
+      <p:sp>
+        <p:nvSpPr>
+          <p:cNvPr id="2" name="Header Placeholder 1"/>
+          <p:cNvSpPr>
+            <a:spLocks noGrp="1"/>
+          </p:cNvSpPr>
+          <p:nvPr>
+            <p:ph type="hdr" sz="quarter"/>
+          </p:nvPr>
+        </p:nvSpPr>
+        <p:spPr>
+          <a:xfrm>
+            <a:off x="0" y="0"/>
+            <a:ext cx="2971800" cy="458788"/>
+          </a:xfrm>
+          <a:prstGeom prst="rect">
+            <a:avLst/>
+          </a:prstGeom>
+        </p:spPr>
+        <p:txBody>
+          <a:bodyPr vert="horz" lIns="91440" tIns="45720" rIns="91440" bIns="45720" rtlCol="0"/>
+          <a:lstStyle>
+            <a:lvl1pPr algn="l">
+              <a:defRPr sz="1200"/>
+            </a:lvl1pPr>
+          </a:lstStyle>
+          <a:p>
+            <a:endParaRPr lang="en-GB"/>
+          </a:p>
+        </p:txBody>
+      </p:sp>
+      <p:sp>
+        <p:nvSpPr>
+          <p:cNvPr id="3" name="Date Placeholder 2"/>
+          <p:cNvSpPr>
+            <a:spLocks noGrp="1"/>
+          </p:cNvSpPr>
+          <p:nvPr>
+            <p:ph type="dt" idx="1"/>
+          </p:nvPr>
+        </p:nvSpPr>
+        <p:spPr>
+          <a:xfrm>
+            <a:off x="3884613" y="0"/>
+            <a:ext cx="2971800" cy="458788"/>
+          </a:xfrm>
+          <a:prstGeom prst="rect">
+            <a:avLst/>
+          </a:prstGeom>
+        </p:spPr>
+        <p:txBody>
+          <a:bodyPr vert="horz" lIns="91440" tIns="45720" rIns="91440" bIns="45720" rtlCol="0"/>
+          <a:lstStyle>
+            <a:lvl1pPr algn="r">
+              <a:defRPr sz="1200"/>
+            </a:lvl1pPr>
+          </a:lstStyle>
+          <a:p>
+            <a:fld id="{9BC398B7-99B5-4C62-BB1D-18AAEC8B886A}" type="datetimeFigureOut">
+              <a:rPr lang="en-GB" smtClean="0"/>
+              <a:t>15/10/2020</a:t>
+            </a:fld>
+            <a:endParaRPr lang="en-GB"/>
+          </a:p>
+        </p:txBody>
+      </p:sp>
+      <p:sp>
+        <p:nvSpPr>
+          <p:cNvPr id="4" name="Slide Image Placeholder 3"/>
+          <p:cNvSpPr>
+            <a:spLocks noGrp="1" noRot="1" noChangeAspect="1"/>
+          </p:cNvSpPr>
+          <p:nvPr>
+            <p:ph type="sldImg" idx="2"/>
+          </p:nvPr>
+        </p:nvSpPr>
+        <p:spPr>
+          <a:xfrm>
+            <a:off x="685800" y="1143000"/>
+            <a:ext cx="5486400" cy="3086100"/>
+          </a:xfrm>
+          <a:prstGeom prst="rect">
+            <a:avLst/>
+          </a:prstGeom>
+          <a:noFill/>
+          <a:ln w="12700">
+            <a:solidFill>
+              <a:prstClr val="black"/>
+            </a:solidFill>
+          </a:ln>
+        </p:spPr>
+        <p:txBody>
+          <a:bodyPr vert="horz" lIns="91440" tIns="45720" rIns="91440" bIns="45720" rtlCol="0" anchor="ctr"/>
+          <a:lstStyle/>
+          <a:p>
+            <a:endParaRPr lang="en-GB"/>
+          </a:p>
+        </p:txBody>
+      </p:sp>
+      <p:sp>
+        <p:nvSpPr>
+          <p:cNvPr id="5" name="Notes Placeholder 4"/>
+          <p:cNvSpPr>
+            <a:spLocks noGrp="1"/>
+          </p:cNvSpPr>
+          <p:nvPr>
+            <p:ph type="body" sz="quarter" idx="3"/>
+          </p:nvPr>
+        </p:nvSpPr>
+        <p:spPr>
+          <a:xfrm>
+            <a:off x="685800" y="4400550"/>
+            <a:ext cx="5486400" cy="3600450"/>
+          </a:xfrm>
+          <a:prstGeom prst="rect">
+            <a:avLst/>
+          </a:prstGeom>
+        </p:spPr>
+        <p:txBody>
+          <a:bodyPr vert="horz" lIns="91440" tIns="45720" rIns="91440" bIns="45720" rtlCol="0"/>
+          <a:lstStyle/>
+          <a:p>
+            <a:pPr lvl="0"/>
+            <a:r>
+              <a:rPr lang="en-US"/>
+              <a:t>Click to edit Master text styles</a:t>
+            </a:r>
+          </a:p>
+          <a:p>
+            <a:pPr lvl="1"/>
+            <a:r>
+              <a:rPr lang="en-US"/>
+              <a:t>Second level</a:t>
+            </a:r>
+          </a:p>
+          <a:p>
+            <a:pPr lvl="2"/>
+            <a:r>
+              <a:rPr lang="en-US"/>
+              <a:t>Third level</a:t>
+            </a:r>
+          </a:p>
+          <a:p>
+            <a:pPr lvl="3"/>
+            <a:r>
+              <a:rPr lang="en-US"/>
+              <a:t>Fourth level</a:t>
+            </a:r>
+          </a:p>
+          <a:p>
+            <a:pPr lvl="4"/>
+            <a:r>
+              <a:rPr lang="en-US"/>
+              <a:t>Fifth level</a:t>
+            </a:r>
+            <a:endParaRPr lang="en-GB"/>
+          </a:p>
+        </p:txBody>
+      </p:sp>
+      <p:sp>
+        <p:nvSpPr>
+          <p:cNvPr id="6" name="Footer Placeholder 5"/>
+          <p:cNvSpPr>
+            <a:spLocks noGrp="1"/>
+          </p:cNvSpPr>
+          <p:nvPr>
+            <p:ph type="ftr" sz="quarter" idx="4"/>
+          </p:nvPr>
+        </p:nvSpPr>
+        <p:spPr>
+          <a:xfrm>
+            <a:off x="0" y="8685213"/>
+            <a:ext cx="2971800" cy="458787"/>
+          </a:xfrm>
+          <a:prstGeom prst="rect">
+            <a:avLst/>
+          </a:prstGeom>
+        </p:spPr>
+        <p:txBody>
+          <a:bodyPr vert="horz" lIns="91440" tIns="45720" rIns="91440" bIns="45720" rtlCol="0" anchor="b"/>
+          <a:lstStyle>
+            <a:lvl1pPr algn="l">
+              <a:defRPr sz="1200"/>
+            </a:lvl1pPr>
+          </a:lstStyle>
+          <a:p>
+            <a:endParaRPr lang="en-GB"/>
+          </a:p>
+        </p:txBody>
+      </p:sp>
+      <p:sp>
+        <p:nvSpPr>
+          <p:cNvPr id="7" name="Slide Number Placeholder 6"/>
+          <p:cNvSpPr>
+            <a:spLocks noGrp="1"/>
+          </p:cNvSpPr>
+          <p:nvPr>
+            <p:ph type="sldNum" sz="quarter" idx="5"/>
+          </p:nvPr>
+        </p:nvSpPr>
+        <p:spPr>
+          <a:xfrm>
+            <a:off x="3884613" y="8685213"/>
+            <a:ext cx="2971800" cy="458787"/>
+          </a:xfrm>
+          <a:prstGeom prst="rect">
+            <a:avLst/>
+          </a:prstGeom>
+        </p:spPr>
+        <p:txBody>
+          <a:bodyPr vert="horz" lIns="91440" tIns="45720" rIns="91440" bIns="45720" rtlCol="0" anchor="b"/>
+          <a:lstStyle>
+            <a:lvl1pPr algn="r">
+              <a:defRPr sz="1200"/>
+            </a:lvl1pPr>
+          </a:lstStyle>
+          <a:p>
+            <a:fld id="{8509DE99-A538-4228-9216-F56B55DD7059}" type="slidenum">
+              <a:rPr lang="en-GB" smtClean="0"/>
+              <a:t>‹#›</a:t>
+            </a:fld>
+            <a:endParaRPr lang="en-GB"/>
+          </a:p>
+        </p:txBody>
+      </p:sp>
+    </p:spTree>
+    <p:extLst>
+      <p:ext uri="{BB962C8B-B14F-4D97-AF65-F5344CB8AC3E}">
+        <p14:creationId xmlns:p14="http://schemas.microsoft.com/office/powerpoint/2010/main" val="3899876745"/>
+      </p:ext>
+    </p:extLst>
+  </p:cSld>
+  <p:clrMap bg1="lt1" tx1="dk1" bg2="lt2" tx2="dk2" accent1="accent1" accent2="accent2" accent3="accent3" accent4="accent4" accent5="accent5" accent6="accent6" hlink="hlink" folHlink="folHlink"/>
+  <p:notesStyle>
+    <a:lvl1pPr marL="0" algn="l" defTabSz="914400" rtl="0" eaLnBrk="1" latinLnBrk="0" hangingPunct="1">
+      <a:defRPr sz="1200" kern="1200">
+        <a:solidFill>
+          <a:schemeClr val="tx1"/>
+        </a:solidFill>
+        <a:latin typeface="+mn-lt"/>
+        <a:ea typeface="+mn-ea"/>
+        <a:cs typeface="+mn-cs"/>
+      </a:defRPr>
+    </a:lvl1pPr>
+    <a:lvl2pPr marL="457200" algn="l" defTabSz="914400" rtl="0" eaLnBrk="1" latinLnBrk="0" hangingPunct="1">
+      <a:defRPr sz="1200" kern="1200">
+        <a:solidFill>
+          <a:schemeClr val="tx1"/>
+        </a:solidFill>
+        <a:latin typeface="+mn-lt"/>
+        <a:ea typeface="+mn-ea"/>
+        <a:cs typeface="+mn-cs"/>
+      </a:defRPr>
+    </a:lvl2pPr>
+    <a:lvl3pPr marL="914400" algn="l" defTabSz="914400" rtl="0" eaLnBrk="1" latinLnBrk="0" hangingPunct="1">
+      <a:defRPr sz="1200" kern="1200">
+        <a:solidFill>
+          <a:schemeClr val="tx1"/>
+        </a:solidFill>
+        <a:latin typeface="+mn-lt"/>
+        <a:ea typeface="+mn-ea"/>
+        <a:cs typeface="+mn-cs"/>
+      </a:defRPr>
+    </a:lvl3pPr>
+    <a:lvl4pPr marL="1371600" algn="l" defTabSz="914400" rtl="0" eaLnBrk="1" latinLnBrk="0" hangingPunct="1">
+      <a:defRPr sz="1200" kern="1200">
+        <a:solidFill>
+          <a:schemeClr val="tx1"/>
+        </a:solidFill>
+        <a:latin typeface="+mn-lt"/>
+        <a:ea typeface="+mn-ea"/>
+        <a:cs typeface="+mn-cs"/>
+      </a:defRPr>
+    </a:lvl4pPr>
+    <a:lvl5pPr marL="1828800" algn="l" defTabSz="914400" rtl="0" eaLnBrk="1" latinLnBrk="0" hangingPunct="1">
+      <a:defRPr sz="1200" kern="1200">
+        <a:solidFill>
+          <a:schemeClr val="tx1"/>
+        </a:solidFill>
+        <a:latin typeface="+mn-lt"/>
+        <a:ea typeface="+mn-ea"/>
+        <a:cs typeface="+mn-cs"/>
+      </a:defRPr>
+    </a:lvl5pPr>
+    <a:lvl6pPr marL="2286000" algn="l" defTabSz="914400" rtl="0" eaLnBrk="1" latinLnBrk="0" hangingPunct="1">
+      <a:defRPr sz="1200" kern="1200">
+        <a:solidFill>
+          <a:schemeClr val="tx1"/>
+        </a:solidFill>
+        <a:latin typeface="+mn-lt"/>
+        <a:ea typeface="+mn-ea"/>
+        <a:cs typeface="+mn-cs"/>
+      </a:defRPr>
+    </a:lvl6pPr>
+    <a:lvl7pPr marL="2743200" algn="l" defTabSz="914400" rtl="0" eaLnBrk="1" latinLnBrk="0" hangingPunct="1">
+      <a:defRPr sz="1200" kern="1200">
+        <a:solidFill>
+          <a:schemeClr val="tx1"/>
+        </a:solidFill>
+        <a:latin typeface="+mn-lt"/>
+        <a:ea typeface="+mn-ea"/>
+        <a:cs typeface="+mn-cs"/>
+      </a:defRPr>
+    </a:lvl7pPr>
+    <a:lvl8pPr marL="3200400" algn="l" defTabSz="914400" rtl="0" eaLnBrk="1" latinLnBrk="0" hangingPunct="1">
+      <a:defRPr sz="1200" kern="1200">
+        <a:solidFill>
+          <a:schemeClr val="tx1"/>
+        </a:solidFill>
+        <a:latin typeface="+mn-lt"/>
+        <a:ea typeface="+mn-ea"/>
+        <a:cs typeface="+mn-cs"/>
+      </a:defRPr>
+    </a:lvl8pPr>
+    <a:lvl9pPr marL="3657600" algn="l" defTabSz="914400" rtl="0" eaLnBrk="1" latinLnBrk="0" hangingPunct="1">
+      <a:defRPr sz="1200" kern="1200">
+        <a:solidFill>
+          <a:schemeClr val="tx1"/>
+        </a:solidFill>
+        <a:latin typeface="+mn-lt"/>
+        <a:ea typeface="+mn-ea"/>
+        <a:cs typeface="+mn-cs"/>
+      </a:defRPr>
+    </a:lvl9pPr>
+  </p:notesStyle>
+</p:notesMaster>
+</file>
+
+<file path=ppt/notesSlides/notesSlide1.xml><?xml version="1.0" encoding="utf-8"?>
+<p:notes xmlns:a="http://schemas.openxmlformats.org/drawingml/2006/main" xmlns:r="http://schemas.openxmlformats.org/officeDocument/2006/relationships" xmlns:p="http://schemas.openxmlformats.org/presentationml/2006/main">
+  <p:cSld>
+    <p:spTree>
+      <p:nvGrpSpPr>
+        <p:cNvPr id="1" name=""/>
+        <p:cNvGrpSpPr/>
+        <p:nvPr/>
+      </p:nvGrpSpPr>
+      <p:grpSpPr>
+        <a:xfrm>
+          <a:off x="0" y="0"/>
+          <a:ext cx="0" cy="0"/>
+          <a:chOff x="0" y="0"/>
+          <a:chExt cx="0" cy="0"/>
+        </a:xfrm>
+      </p:grpSpPr>
+      <p:sp>
+        <p:nvSpPr>
+          <p:cNvPr id="2" name="Slide Image Placeholder 1"/>
+          <p:cNvSpPr>
+            <a:spLocks noGrp="1" noRot="1" noChangeAspect="1"/>
+          </p:cNvSpPr>
+          <p:nvPr>
+            <p:ph type="sldImg"/>
+          </p:nvPr>
+        </p:nvSpPr>
+        <p:spPr/>
+      </p:sp>
+      <p:sp>
+        <p:nvSpPr>
+          <p:cNvPr id="3" name="Notes Placeholder 2"/>
+          <p:cNvSpPr>
+            <a:spLocks noGrp="1"/>
+          </p:cNvSpPr>
+          <p:nvPr>
+            <p:ph type="body" idx="1"/>
+          </p:nvPr>
+        </p:nvSpPr>
+        <p:spPr/>
+        <p:txBody>
+          <a:bodyPr/>
+          <a:lstStyle/>
+          <a:p>
+            <a:r>
+              <a:rPr lang="en-GB" dirty="0"/>
+              <a:t>These puns write themselves.</a:t>
+            </a:r>
+          </a:p>
+        </p:txBody>
+      </p:sp>
+      <p:sp>
+        <p:nvSpPr>
+          <p:cNvPr id="4" name="Slide Number Placeholder 3"/>
+          <p:cNvSpPr>
+            <a:spLocks noGrp="1"/>
+          </p:cNvSpPr>
+          <p:nvPr>
+            <p:ph type="sldNum" sz="quarter" idx="5"/>
+          </p:nvPr>
+        </p:nvSpPr>
+        <p:spPr/>
+        <p:txBody>
+          <a:bodyPr/>
+          <a:lstStyle/>
+          <a:p>
+            <a:fld id="{8509DE99-A538-4228-9216-F56B55DD7059}" type="slidenum">
+              <a:rPr lang="en-GB" smtClean="0"/>
+              <a:t>3</a:t>
+            </a:fld>
+            <a:endParaRPr lang="en-GB"/>
+          </a:p>
+        </p:txBody>
+      </p:sp>
+    </p:spTree>
+    <p:extLst>
+      <p:ext uri="{BB962C8B-B14F-4D97-AF65-F5344CB8AC3E}">
+        <p14:creationId xmlns:p14="http://schemas.microsoft.com/office/powerpoint/2010/main" val="2940213420"/>
+      </p:ext>
+    </p:extLst>
+  </p:cSld>
+  <p:clrMapOvr>
+    <a:masterClrMapping/>
+  </p:clrMapOvr>
+</p:notes>
+</file>
+
+<file path=ppt/notesSlides/notesSlide2.xml><?xml version="1.0" encoding="utf-8"?>
+<p:notes xmlns:a="http://schemas.openxmlformats.org/drawingml/2006/main" xmlns:r="http://schemas.openxmlformats.org/officeDocument/2006/relationships" xmlns:p="http://schemas.openxmlformats.org/presentationml/2006/main">
+  <p:cSld>
+    <p:spTree>
+      <p:nvGrpSpPr>
+        <p:cNvPr id="1" name=""/>
+        <p:cNvGrpSpPr/>
+        <p:nvPr/>
+      </p:nvGrpSpPr>
+      <p:grpSpPr>
+        <a:xfrm>
+          <a:off x="0" y="0"/>
+          <a:ext cx="0" cy="0"/>
+          <a:chOff x="0" y="0"/>
+          <a:chExt cx="0" cy="0"/>
+        </a:xfrm>
+      </p:grpSpPr>
+      <p:sp>
+        <p:nvSpPr>
+          <p:cNvPr id="2" name="Slide Image Placeholder 1"/>
+          <p:cNvSpPr>
+            <a:spLocks noGrp="1" noRot="1" noChangeAspect="1"/>
+          </p:cNvSpPr>
+          <p:nvPr>
+            <p:ph type="sldImg"/>
+          </p:nvPr>
+        </p:nvSpPr>
+        <p:spPr/>
+      </p:sp>
+      <p:sp>
+        <p:nvSpPr>
+          <p:cNvPr id="3" name="Notes Placeholder 2"/>
+          <p:cNvSpPr>
+            <a:spLocks noGrp="1"/>
+          </p:cNvSpPr>
+          <p:nvPr>
+            <p:ph type="body" idx="1"/>
+          </p:nvPr>
+        </p:nvSpPr>
+        <p:spPr/>
+        <p:txBody>
+          <a:bodyPr/>
+          <a:lstStyle/>
+          <a:p>
+            <a:endParaRPr lang="en-GB" dirty="0"/>
+          </a:p>
+        </p:txBody>
+      </p:sp>
+      <p:sp>
+        <p:nvSpPr>
+          <p:cNvPr id="4" name="Slide Number Placeholder 3"/>
+          <p:cNvSpPr>
+            <a:spLocks noGrp="1"/>
+          </p:cNvSpPr>
+          <p:nvPr>
+            <p:ph type="sldNum" sz="quarter" idx="5"/>
+          </p:nvPr>
+        </p:nvSpPr>
+        <p:spPr/>
+        <p:txBody>
+          <a:bodyPr/>
+          <a:lstStyle/>
+          <a:p>
+            <a:fld id="{8509DE99-A538-4228-9216-F56B55DD7059}" type="slidenum">
+              <a:rPr lang="en-GB" smtClean="0"/>
+              <a:t>5</a:t>
+            </a:fld>
+            <a:endParaRPr lang="en-GB"/>
+          </a:p>
+        </p:txBody>
+      </p:sp>
+    </p:spTree>
+    <p:extLst>
+      <p:ext uri="{BB962C8B-B14F-4D97-AF65-F5344CB8AC3E}">
+        <p14:creationId xmlns:p14="http://schemas.microsoft.com/office/powerpoint/2010/main" val="2020798082"/>
+      </p:ext>
+    </p:extLst>
+  </p:cSld>
+  <p:clrMapOvr>
+    <a:masterClrMapping/>
+  </p:clrMapOvr>
+</p:notes>
+</file>
+
+<file path=ppt/notesSlides/notesSlide3.xml><?xml version="1.0" encoding="utf-8"?>
+<p:notes xmlns:a="http://schemas.openxmlformats.org/drawingml/2006/main" xmlns:r="http://schemas.openxmlformats.org/officeDocument/2006/relationships" xmlns:p="http://schemas.openxmlformats.org/presentationml/2006/main">
+  <p:cSld>
+    <p:spTree>
+      <p:nvGrpSpPr>
+        <p:cNvPr id="1" name=""/>
+        <p:cNvGrpSpPr/>
+        <p:nvPr/>
+      </p:nvGrpSpPr>
+      <p:grpSpPr>
+        <a:xfrm>
+          <a:off x="0" y="0"/>
+          <a:ext cx="0" cy="0"/>
+          <a:chOff x="0" y="0"/>
+          <a:chExt cx="0" cy="0"/>
+        </a:xfrm>
+      </p:grpSpPr>
+      <p:sp>
+        <p:nvSpPr>
+          <p:cNvPr id="2" name="Slide Image Placeholder 1"/>
+          <p:cNvSpPr>
+            <a:spLocks noGrp="1" noRot="1" noChangeAspect="1"/>
+          </p:cNvSpPr>
+          <p:nvPr>
+            <p:ph type="sldImg"/>
+          </p:nvPr>
+        </p:nvSpPr>
+        <p:spPr/>
+      </p:sp>
+      <p:sp>
+        <p:nvSpPr>
+          <p:cNvPr id="3" name="Notes Placeholder 2"/>
+          <p:cNvSpPr>
+            <a:spLocks noGrp="1"/>
+          </p:cNvSpPr>
+          <p:nvPr>
+            <p:ph type="body" idx="1"/>
+          </p:nvPr>
+        </p:nvSpPr>
+        <p:spPr/>
+        <p:txBody>
+          <a:bodyPr/>
+          <a:lstStyle/>
+          <a:p>
+            <a:r>
+              <a:rPr lang="en-GB" dirty="0"/>
+              <a:t>Successes</a:t>
+            </a:r>
+          </a:p>
+          <a:p>
+            <a:r>
+              <a:rPr lang="en-GB" dirty="0"/>
+              <a:t>Metadata + index.html: did that on Monday</a:t>
+            </a:r>
+          </a:p>
+          <a:p>
+            <a:r>
+              <a:rPr lang="en-GB" dirty="0"/>
+              <a:t>GUI: did that on Tuesday</a:t>
+            </a:r>
+          </a:p>
+          <a:p>
+            <a:r>
+              <a:rPr lang="en-GB" dirty="0"/>
+              <a:t>Escape characters: did that on Wednesday</a:t>
+            </a:r>
+          </a:p>
+          <a:p>
+            <a:r>
+              <a:rPr lang="en-GB" dirty="0"/>
+              <a:t>Presentation: made this on Thursday</a:t>
+            </a:r>
+          </a:p>
+          <a:p>
+            <a:endParaRPr lang="en-GB" dirty="0"/>
+          </a:p>
+          <a:p>
+            <a:r>
+              <a:rPr lang="en-GB" dirty="0"/>
+              <a:t>Failures</a:t>
+            </a:r>
+          </a:p>
+          <a:p>
+            <a:r>
+              <a:rPr lang="en-GB" dirty="0"/>
+              <a:t>Markdown: Spent most of Wednesday trying to do that.</a:t>
+            </a:r>
+          </a:p>
+          <a:p>
+            <a:r>
+              <a:rPr lang="en-GB" dirty="0"/>
+              <a:t>	Probably going to just use an existing implementation made by someone else instead.</a:t>
+            </a:r>
+          </a:p>
+          <a:p>
+            <a:r>
+              <a:rPr lang="en-GB" dirty="0"/>
+              <a:t>	However, I probably need to clean up my HECC-IT code and work out exactly what is going where before I attempt doing that</a:t>
+            </a:r>
+          </a:p>
+          <a:p>
+            <a:endParaRPr lang="en-GB" dirty="0"/>
+          </a:p>
+          <a:p>
+            <a:r>
+              <a:rPr lang="en-GB" dirty="0"/>
+              <a:t>Unit tests: Didn’t get around to doing that.</a:t>
+            </a:r>
+          </a:p>
+          <a:p>
+            <a:r>
+              <a:rPr lang="en-GB" dirty="0"/>
+              <a:t>	The overall design of the Java component of HECC-IT wasn’t very well planned out in advance, so I’ve honestly forgotten where exactly I would pass inputs to and get outputs from.</a:t>
+            </a:r>
+          </a:p>
+          <a:p>
+            <a:endParaRPr lang="en-GB" dirty="0"/>
+          </a:p>
+        </p:txBody>
+      </p:sp>
+      <p:sp>
+        <p:nvSpPr>
+          <p:cNvPr id="4" name="Slide Number Placeholder 3"/>
+          <p:cNvSpPr>
+            <a:spLocks noGrp="1"/>
+          </p:cNvSpPr>
+          <p:nvPr>
+            <p:ph type="sldNum" sz="quarter" idx="5"/>
+          </p:nvPr>
+        </p:nvSpPr>
+        <p:spPr/>
+        <p:txBody>
+          <a:bodyPr/>
+          <a:lstStyle/>
+          <a:p>
+            <a:fld id="{8509DE99-A538-4228-9216-F56B55DD7059}" type="slidenum">
+              <a:rPr lang="en-GB" smtClean="0"/>
+              <a:t>8</a:t>
+            </a:fld>
+            <a:endParaRPr lang="en-GB"/>
+          </a:p>
+        </p:txBody>
+      </p:sp>
+    </p:spTree>
+    <p:extLst>
+      <p:ext uri="{BB962C8B-B14F-4D97-AF65-F5344CB8AC3E}">
+        <p14:creationId xmlns:p14="http://schemas.microsoft.com/office/powerpoint/2010/main" val="3504918023"/>
+      </p:ext>
+    </p:extLst>
+  </p:cSld>
+  <p:clrMapOvr>
+    <a:masterClrMapping/>
+  </p:clrMapOvr>
+</p:notes>
+</file>
+
+<file path=ppt/notesSlides/notesSlide4.xml><?xml version="1.0" encoding="utf-8"?>
+<p:notes xmlns:a="http://schemas.openxmlformats.org/drawingml/2006/main" xmlns:r="http://schemas.openxmlformats.org/officeDocument/2006/relationships" xmlns:p="http://schemas.openxmlformats.org/presentationml/2006/main">
+  <p:cSld>
+    <p:spTree>
+      <p:nvGrpSpPr>
+        <p:cNvPr id="1" name=""/>
+        <p:cNvGrpSpPr/>
+        <p:nvPr/>
+      </p:nvGrpSpPr>
+      <p:grpSpPr>
+        <a:xfrm>
+          <a:off x="0" y="0"/>
+          <a:ext cx="0" cy="0"/>
+          <a:chOff x="0" y="0"/>
+          <a:chExt cx="0" cy="0"/>
+        </a:xfrm>
+      </p:grpSpPr>
+      <p:sp>
+        <p:nvSpPr>
+          <p:cNvPr id="2" name="Slide Image Placeholder 1"/>
+          <p:cNvSpPr>
+            <a:spLocks noGrp="1" noRot="1" noChangeAspect="1"/>
+          </p:cNvSpPr>
+          <p:nvPr>
+            <p:ph type="sldImg"/>
+          </p:nvPr>
+        </p:nvSpPr>
+        <p:spPr/>
+      </p:sp>
+      <p:sp>
+        <p:nvSpPr>
+          <p:cNvPr id="3" name="Notes Placeholder 2"/>
+          <p:cNvSpPr>
+            <a:spLocks noGrp="1"/>
+          </p:cNvSpPr>
+          <p:nvPr>
+            <p:ph type="body" idx="1"/>
+          </p:nvPr>
+        </p:nvSpPr>
+        <p:spPr/>
+        <p:txBody>
+          <a:bodyPr/>
+          <a:lstStyle/>
+          <a:p>
+            <a:r>
+              <a:rPr lang="en-GB" dirty="0"/>
+              <a:t>It works though, as I’ll demonstrate shortly.</a:t>
+            </a:r>
+          </a:p>
+        </p:txBody>
+      </p:sp>
+      <p:sp>
+        <p:nvSpPr>
+          <p:cNvPr id="4" name="Slide Number Placeholder 3"/>
+          <p:cNvSpPr>
+            <a:spLocks noGrp="1"/>
+          </p:cNvSpPr>
+          <p:nvPr>
+            <p:ph type="sldNum" sz="quarter" idx="5"/>
+          </p:nvPr>
+        </p:nvSpPr>
+        <p:spPr/>
+        <p:txBody>
+          <a:bodyPr/>
+          <a:lstStyle/>
+          <a:p>
+            <a:fld id="{8509DE99-A538-4228-9216-F56B55DD7059}" type="slidenum">
+              <a:rPr lang="en-GB" smtClean="0"/>
+              <a:t>9</a:t>
+            </a:fld>
+            <a:endParaRPr lang="en-GB"/>
+          </a:p>
+        </p:txBody>
+      </p:sp>
+    </p:spTree>
+    <p:extLst>
+      <p:ext uri="{BB962C8B-B14F-4D97-AF65-F5344CB8AC3E}">
+        <p14:creationId xmlns:p14="http://schemas.microsoft.com/office/powerpoint/2010/main" val="1804620497"/>
+      </p:ext>
+    </p:extLst>
+  </p:cSld>
+  <p:clrMapOvr>
+    <a:masterClrMapping/>
+  </p:clrMapOvr>
+</p:notes>
+</file>
+
+<file path=ppt/notesSlides/notesSlide5.xml><?xml version="1.0" encoding="utf-8"?>
+<p:notes xmlns:a="http://schemas.openxmlformats.org/drawingml/2006/main" xmlns:r="http://schemas.openxmlformats.org/officeDocument/2006/relationships" xmlns:p="http://schemas.openxmlformats.org/presentationml/2006/main">
+  <p:cSld>
+    <p:spTree>
+      <p:nvGrpSpPr>
+        <p:cNvPr id="1" name=""/>
+        <p:cNvGrpSpPr/>
+        <p:nvPr/>
+      </p:nvGrpSpPr>
+      <p:grpSpPr>
+        <a:xfrm>
+          <a:off x="0" y="0"/>
+          <a:ext cx="0" cy="0"/>
+          <a:chOff x="0" y="0"/>
+          <a:chExt cx="0" cy="0"/>
+        </a:xfrm>
+      </p:grpSpPr>
+      <p:sp>
+        <p:nvSpPr>
+          <p:cNvPr id="2" name="Slide Image Placeholder 1"/>
+          <p:cNvSpPr>
+            <a:spLocks noGrp="1" noRot="1" noChangeAspect="1"/>
+          </p:cNvSpPr>
+          <p:nvPr>
+            <p:ph type="sldImg"/>
+          </p:nvPr>
+        </p:nvSpPr>
+        <p:spPr/>
+      </p:sp>
+      <p:sp>
+        <p:nvSpPr>
+          <p:cNvPr id="3" name="Notes Placeholder 2"/>
+          <p:cNvSpPr>
+            <a:spLocks noGrp="1"/>
+          </p:cNvSpPr>
+          <p:nvPr>
+            <p:ph type="body" idx="1"/>
+          </p:nvPr>
+        </p:nvSpPr>
+        <p:spPr/>
+        <p:txBody>
+          <a:bodyPr/>
+          <a:lstStyle/>
+          <a:p>
+            <a:r>
+              <a:rPr lang="en-GB" dirty="0"/>
+              <a:t>Killing the spaghetti monster:</a:t>
+            </a:r>
+          </a:p>
+          <a:p>
+            <a:r>
+              <a:rPr lang="en-GB" dirty="0"/>
+              <a:t>	Go through my code and work out what everything currently does</a:t>
+            </a:r>
+          </a:p>
+          <a:p>
+            <a:r>
+              <a:rPr lang="en-GB" dirty="0"/>
+              <a:t>	Work out an appropriate design pattern that I should use</a:t>
+            </a:r>
+          </a:p>
+          <a:p>
+            <a:r>
+              <a:rPr lang="en-GB" dirty="0"/>
+              <a:t>	Refactor everything into that pattern</a:t>
+            </a:r>
+          </a:p>
+          <a:p>
+            <a:endParaRPr lang="en-GB" dirty="0"/>
+          </a:p>
+        </p:txBody>
+      </p:sp>
+      <p:sp>
+        <p:nvSpPr>
+          <p:cNvPr id="4" name="Slide Number Placeholder 3"/>
+          <p:cNvSpPr>
+            <a:spLocks noGrp="1"/>
+          </p:cNvSpPr>
+          <p:nvPr>
+            <p:ph type="sldNum" sz="quarter" idx="5"/>
+          </p:nvPr>
+        </p:nvSpPr>
+        <p:spPr/>
+        <p:txBody>
+          <a:bodyPr/>
+          <a:lstStyle/>
+          <a:p>
+            <a:fld id="{8509DE99-A538-4228-9216-F56B55DD7059}" type="slidenum">
+              <a:rPr lang="en-GB" smtClean="0"/>
+              <a:t>10</a:t>
+            </a:fld>
+            <a:endParaRPr lang="en-GB"/>
+          </a:p>
+        </p:txBody>
+      </p:sp>
+    </p:spTree>
+    <p:extLst>
+      <p:ext uri="{BB962C8B-B14F-4D97-AF65-F5344CB8AC3E}">
+        <p14:creationId xmlns:p14="http://schemas.microsoft.com/office/powerpoint/2010/main" val="795228418"/>
+      </p:ext>
+    </p:extLst>
+  </p:cSld>
+  <p:clrMapOvr>
+    <a:masterClrMapping/>
+  </p:clrMapOvr>
+</p:notes>
+</file>
+
+<file path=ppt/notesSlides/notesSlide6.xml><?xml version="1.0" encoding="utf-8"?>
+<p:notes xmlns:a="http://schemas.openxmlformats.org/drawingml/2006/main" xmlns:r="http://schemas.openxmlformats.org/officeDocument/2006/relationships" xmlns:p="http://schemas.openxmlformats.org/presentationml/2006/main">
+  <p:cSld>
+    <p:spTree>
+      <p:nvGrpSpPr>
+        <p:cNvPr id="1" name=""/>
+        <p:cNvGrpSpPr/>
+        <p:nvPr/>
+      </p:nvGrpSpPr>
+      <p:grpSpPr>
+        <a:xfrm>
+          <a:off x="0" y="0"/>
+          <a:ext cx="0" cy="0"/>
+          <a:chOff x="0" y="0"/>
+          <a:chExt cx="0" cy="0"/>
+        </a:xfrm>
+      </p:grpSpPr>
+      <p:sp>
+        <p:nvSpPr>
+          <p:cNvPr id="2" name="Slide Image Placeholder 1"/>
+          <p:cNvSpPr>
+            <a:spLocks noGrp="1" noRot="1" noChangeAspect="1"/>
+          </p:cNvSpPr>
+          <p:nvPr>
+            <p:ph type="sldImg"/>
+          </p:nvPr>
+        </p:nvSpPr>
+        <p:spPr/>
+      </p:sp>
+      <p:sp>
+        <p:nvSpPr>
+          <p:cNvPr id="3" name="Notes Placeholder 2"/>
+          <p:cNvSpPr>
+            <a:spLocks noGrp="1"/>
+          </p:cNvSpPr>
+          <p:nvPr>
+            <p:ph type="body" idx="1"/>
+          </p:nvPr>
+        </p:nvSpPr>
+        <p:spPr/>
+        <p:txBody>
+          <a:bodyPr/>
+          <a:lstStyle/>
+          <a:p>
+            <a:r>
+              <a:rPr lang="en-GB" dirty="0"/>
+              <a:t>141 hours logged over the summer</a:t>
+            </a:r>
+          </a:p>
+          <a:p>
+            <a:r>
+              <a:rPr lang="en-GB" dirty="0"/>
+              <a:t>https://cseejira.essex.ac.uk/secure/ConfigureReport.jspa?versionId=14012&amp;sortingOrder=least&amp;completedFilter=all&amp;subtaskInclusion=onlySelected&amp;selectedProjectId=15147&amp;reportKey=com.atlassian.jira.jira-core-reports-plugin%3Atime-tracking&amp;atl_token=B9HA-A75A-1MQD-BVTB_4f04fba4db40b5c31eb9257dfd36089480eca8fe_lin&amp;Next=Next</a:t>
+            </a:r>
+          </a:p>
+          <a:p>
+            <a:endParaRPr lang="en-GB" dirty="0"/>
+          </a:p>
+          <a:p>
+            <a:r>
+              <a:rPr lang="en-GB" dirty="0"/>
+              <a:t>~20-something hours logged this week</a:t>
+            </a:r>
+          </a:p>
+          <a:p>
+            <a:r>
+              <a:rPr lang="en-GB" dirty="0"/>
+              <a:t>https://cseejira.essex.ac.uk/secure/ConfigureReport.jspa?versionId=-1&amp;sortingOrder=least&amp;completedFilter=all&amp;subtaskInclusion=onlySelected&amp;selectedProjectId=15147&amp;reportKey=com.atlassian.jira.jira-core-reports-plugin%3Atime-tracking&amp;atl_token=B9HA-A75A-1MQD-BVTB_4f04fba4db40b5c31eb9257dfd36089480eca8fe_lin&amp;Next=Next</a:t>
+            </a:r>
+          </a:p>
+          <a:p>
+            <a:endParaRPr lang="en-GB" dirty="0"/>
+          </a:p>
+          <a:p>
+            <a:r>
+              <a:rPr lang="en-GB" dirty="0"/>
+              <a:t>Summer prep work release: https://cseejira.essex.ac.uk/projects/A301034/versions/14012</a:t>
+            </a:r>
+          </a:p>
+        </p:txBody>
+      </p:sp>
+      <p:sp>
+        <p:nvSpPr>
+          <p:cNvPr id="4" name="Slide Number Placeholder 3"/>
+          <p:cNvSpPr>
+            <a:spLocks noGrp="1"/>
+          </p:cNvSpPr>
+          <p:nvPr>
+            <p:ph type="sldNum" sz="quarter" idx="5"/>
+          </p:nvPr>
+        </p:nvSpPr>
+        <p:spPr/>
+        <p:txBody>
+          <a:bodyPr/>
+          <a:lstStyle/>
+          <a:p>
+            <a:fld id="{8509DE99-A538-4228-9216-F56B55DD7059}" type="slidenum">
+              <a:rPr lang="en-GB" smtClean="0"/>
+              <a:t>13</a:t>
+            </a:fld>
+            <a:endParaRPr lang="en-GB"/>
+          </a:p>
+        </p:txBody>
+      </p:sp>
+    </p:spTree>
+    <p:extLst>
+      <p:ext uri="{BB962C8B-B14F-4D97-AF65-F5344CB8AC3E}">
+        <p14:creationId xmlns:p14="http://schemas.microsoft.com/office/powerpoint/2010/main" val="3273949338"/>
+      </p:ext>
+    </p:extLst>
+  </p:cSld>
+  <p:clrMapOvr>
+    <a:masterClrMapping/>
+  </p:clrMapOvr>
+</p:notes>
 </file>
 
 <file path=ppt/slideLayouts/slideLayout1.xml><?xml version="1.0" encoding="utf-8"?>
@@ -325,7 +1852,7 @@
           <a:p>
             <a:fld id="{6ADC2AFF-0D31-422B-95FC-C81A88331D57}" type="datetimeFigureOut">
               <a:rPr lang="en-GB" smtClean="0"/>
-              <a:t>12/10/2020</a:t>
+              <a:t>15/10/2020</a:t>
             </a:fld>
             <a:endParaRPr lang="en-GB"/>
           </a:p>
@@ -525,7 +2052,7 @@
           <a:p>
             <a:fld id="{6ADC2AFF-0D31-422B-95FC-C81A88331D57}" type="datetimeFigureOut">
               <a:rPr lang="en-GB" smtClean="0"/>
-              <a:t>12/10/2020</a:t>
+              <a:t>15/10/2020</a:t>
             </a:fld>
             <a:endParaRPr lang="en-GB"/>
           </a:p>
@@ -735,7 +2262,7 @@
           <a:p>
             <a:fld id="{6ADC2AFF-0D31-422B-95FC-C81A88331D57}" type="datetimeFigureOut">
               <a:rPr lang="en-GB" smtClean="0"/>
-              <a:t>12/10/2020</a:t>
+              <a:t>15/10/2020</a:t>
             </a:fld>
             <a:endParaRPr lang="en-GB"/>
           </a:p>
@@ -935,7 +2462,7 @@
           <a:p>
             <a:fld id="{6ADC2AFF-0D31-422B-95FC-C81A88331D57}" type="datetimeFigureOut">
               <a:rPr lang="en-GB" smtClean="0"/>
-              <a:t>12/10/2020</a:t>
+              <a:t>15/10/2020</a:t>
             </a:fld>
             <a:endParaRPr lang="en-GB"/>
           </a:p>
@@ -1211,7 +2738,7 @@
           <a:p>
             <a:fld id="{6ADC2AFF-0D31-422B-95FC-C81A88331D57}" type="datetimeFigureOut">
               <a:rPr lang="en-GB" smtClean="0"/>
-              <a:t>12/10/2020</a:t>
+              <a:t>15/10/2020</a:t>
             </a:fld>
             <a:endParaRPr lang="en-GB"/>
           </a:p>
@@ -1479,7 +3006,7 @@
           <a:p>
             <a:fld id="{6ADC2AFF-0D31-422B-95FC-C81A88331D57}" type="datetimeFigureOut">
               <a:rPr lang="en-GB" smtClean="0"/>
-              <a:t>12/10/2020</a:t>
+              <a:t>15/10/2020</a:t>
             </a:fld>
             <a:endParaRPr lang="en-GB"/>
           </a:p>
@@ -1894,7 +3421,7 @@
           <a:p>
             <a:fld id="{6ADC2AFF-0D31-422B-95FC-C81A88331D57}" type="datetimeFigureOut">
               <a:rPr lang="en-GB" smtClean="0"/>
-              <a:t>12/10/2020</a:t>
+              <a:t>15/10/2020</a:t>
             </a:fld>
             <a:endParaRPr lang="en-GB"/>
           </a:p>
@@ -2036,7 +3563,7 @@
           <a:p>
             <a:fld id="{6ADC2AFF-0D31-422B-95FC-C81A88331D57}" type="datetimeFigureOut">
               <a:rPr lang="en-GB" smtClean="0"/>
-              <a:t>12/10/2020</a:t>
+              <a:t>15/10/2020</a:t>
             </a:fld>
             <a:endParaRPr lang="en-GB"/>
           </a:p>
@@ -2149,7 +3676,7 @@
           <a:p>
             <a:fld id="{6ADC2AFF-0D31-422B-95FC-C81A88331D57}" type="datetimeFigureOut">
               <a:rPr lang="en-GB" smtClean="0"/>
-              <a:t>12/10/2020</a:t>
+              <a:t>15/10/2020</a:t>
             </a:fld>
             <a:endParaRPr lang="en-GB"/>
           </a:p>
@@ -2462,7 +3989,7 @@
           <a:p>
             <a:fld id="{6ADC2AFF-0D31-422B-95FC-C81A88331D57}" type="datetimeFigureOut">
               <a:rPr lang="en-GB" smtClean="0"/>
-              <a:t>12/10/2020</a:t>
+              <a:t>15/10/2020</a:t>
             </a:fld>
             <a:endParaRPr lang="en-GB"/>
           </a:p>
@@ -2751,7 +4278,7 @@
           <a:p>
             <a:fld id="{6ADC2AFF-0D31-422B-95FC-C81A88331D57}" type="datetimeFigureOut">
               <a:rPr lang="en-GB" smtClean="0"/>
-              <a:t>12/10/2020</a:t>
+              <a:t>15/10/2020</a:t>
             </a:fld>
             <a:endParaRPr lang="en-GB"/>
           </a:p>
@@ -2994,7 +4521,7 @@
           <a:p>
             <a:fld id="{6ADC2AFF-0D31-422B-95FC-C81A88331D57}" type="datetimeFigureOut">
               <a:rPr lang="en-GB" smtClean="0"/>
-              <a:t>12/10/2020</a:t>
+              <a:t>15/10/2020</a:t>
             </a:fld>
             <a:endParaRPr lang="en-GB"/>
           </a:p>
@@ -3430,13 +4957,27 @@
         <p:spPr/>
         <p:txBody>
           <a:bodyPr>
-            <a:normAutofit/>
+            <a:normAutofit fontScale="90000"/>
           </a:bodyPr>
           <a:lstStyle/>
           <a:p>
             <a:r>
               <a:rPr lang="en-GB" dirty="0"/>
-              <a:t>HECC-IT challenge week presentation</a:t>
+              <a:t>Hypertext Game Project</a:t>
+            </a:r>
+            <a:br>
+              <a:rPr lang="en-GB" dirty="0"/>
+            </a:br>
+            <a:r>
+              <a:rPr lang="en-GB" dirty="0"/>
+              <a:t>(HECC-IT)</a:t>
+            </a:r>
+            <a:br>
+              <a:rPr lang="en-GB" dirty="0"/>
+            </a:br>
+            <a:r>
+              <a:rPr lang="en-GB" dirty="0"/>
+              <a:t>Challenge Week Presentation</a:t>
             </a:r>
           </a:p>
         </p:txBody>
@@ -3473,6 +5014,481 @@
     <p:extLst>
       <p:ext uri="{BB962C8B-B14F-4D97-AF65-F5344CB8AC3E}">
         <p14:creationId xmlns:p14="http://schemas.microsoft.com/office/powerpoint/2010/main" val="3782792841"/>
+      </p:ext>
+    </p:extLst>
+  </p:cSld>
+  <p:clrMapOvr>
+    <a:masterClrMapping/>
+  </p:clrMapOvr>
+</p:sld>
+</file>
+
+<file path=ppt/slides/slide10.xml><?xml version="1.0" encoding="utf-8"?>
+<p:sld xmlns:a="http://schemas.openxmlformats.org/drawingml/2006/main" xmlns:r="http://schemas.openxmlformats.org/officeDocument/2006/relationships" xmlns:p="http://schemas.openxmlformats.org/presentationml/2006/main">
+  <p:cSld>
+    <p:spTree>
+      <p:nvGrpSpPr>
+        <p:cNvPr id="1" name=""/>
+        <p:cNvGrpSpPr/>
+        <p:nvPr/>
+      </p:nvGrpSpPr>
+      <p:grpSpPr>
+        <a:xfrm>
+          <a:off x="0" y="0"/>
+          <a:ext cx="0" cy="0"/>
+          <a:chOff x="0" y="0"/>
+          <a:chExt cx="0" cy="0"/>
+        </a:xfrm>
+      </p:grpSpPr>
+      <p:sp>
+        <p:nvSpPr>
+          <p:cNvPr id="2" name="Title 1">
+            <a:extLst>
+              <a:ext uri="{FF2B5EF4-FFF2-40B4-BE49-F238E27FC236}">
+                <a16:creationId xmlns:a16="http://schemas.microsoft.com/office/drawing/2014/main" id="{B5D2829E-2ACA-4037-916C-50054A9342C3}"/>
+              </a:ext>
+            </a:extLst>
+          </p:cNvPr>
+          <p:cNvSpPr>
+            <a:spLocks noGrp="1"/>
+          </p:cNvSpPr>
+          <p:nvPr>
+            <p:ph type="title"/>
+          </p:nvPr>
+        </p:nvSpPr>
+        <p:spPr/>
+        <p:txBody>
+          <a:bodyPr/>
+          <a:lstStyle/>
+          <a:p>
+            <a:r>
+              <a:rPr lang="en-GB" dirty="0"/>
+              <a:t>What’s next</a:t>
+            </a:r>
+          </a:p>
+        </p:txBody>
+      </p:sp>
+      <p:sp>
+        <p:nvSpPr>
+          <p:cNvPr id="3" name="Content Placeholder 2">
+            <a:extLst>
+              <a:ext uri="{FF2B5EF4-FFF2-40B4-BE49-F238E27FC236}">
+                <a16:creationId xmlns:a16="http://schemas.microsoft.com/office/drawing/2014/main" id="{D6CE67FD-BAE5-4A0B-B83A-325919DA02A2}"/>
+              </a:ext>
+            </a:extLst>
+          </p:cNvPr>
+          <p:cNvSpPr>
+            <a:spLocks noGrp="1"/>
+          </p:cNvSpPr>
+          <p:nvPr>
+            <p:ph idx="1"/>
+          </p:nvPr>
+        </p:nvSpPr>
+        <p:spPr/>
+        <p:txBody>
+          <a:bodyPr/>
+          <a:lstStyle/>
+          <a:p>
+            <a:r>
+              <a:rPr lang="en-GB" dirty="0"/>
+              <a:t>Short-term</a:t>
+            </a:r>
+          </a:p>
+          <a:p>
+            <a:pPr lvl="1"/>
+            <a:r>
+              <a:rPr lang="en-GB" dirty="0"/>
+              <a:t>Tame the Spaghetti Monster</a:t>
+            </a:r>
+          </a:p>
+          <a:p>
+            <a:r>
+              <a:rPr lang="en-GB" dirty="0"/>
+              <a:t>Medium term (Week 11)</a:t>
+            </a:r>
+          </a:p>
+          <a:p>
+            <a:pPr lvl="1"/>
+            <a:r>
+              <a:rPr lang="en-GB" dirty="0"/>
+              <a:t>Add support for variables to be declared (probably at the start, within metadata)</a:t>
+            </a:r>
+          </a:p>
+          <a:p>
+            <a:pPr lvl="1"/>
+            <a:r>
+              <a:rPr lang="en-GB" dirty="0"/>
+              <a:t>Create the OH-HECC GUI</a:t>
+            </a:r>
+          </a:p>
+          <a:p>
+            <a:r>
+              <a:rPr lang="en-GB" dirty="0"/>
+              <a:t>Long term</a:t>
+            </a:r>
+          </a:p>
+          <a:p>
+            <a:pPr lvl="1"/>
+            <a:r>
+              <a:rPr lang="en-GB" dirty="0"/>
+              <a:t>Implement functionality for variables within the HECCIN Game (conditional statements showing/hiding content, updating values of variables, </a:t>
+            </a:r>
+            <a:r>
+              <a:rPr lang="en-GB" dirty="0" err="1"/>
+              <a:t>gamestates</a:t>
+            </a:r>
+            <a:r>
+              <a:rPr lang="en-GB" dirty="0"/>
+              <a:t> remembering the state of the variables at that particular point in time, etc)</a:t>
+            </a:r>
+          </a:p>
+          <a:p>
+            <a:pPr lvl="1"/>
+            <a:endParaRPr lang="en-GB" dirty="0"/>
+          </a:p>
+          <a:p>
+            <a:endParaRPr lang="en-GB" dirty="0"/>
+          </a:p>
+        </p:txBody>
+      </p:sp>
+    </p:spTree>
+    <p:extLst>
+      <p:ext uri="{BB962C8B-B14F-4D97-AF65-F5344CB8AC3E}">
+        <p14:creationId xmlns:p14="http://schemas.microsoft.com/office/powerpoint/2010/main" val="2174968697"/>
+      </p:ext>
+    </p:extLst>
+  </p:cSld>
+  <p:clrMapOvr>
+    <a:masterClrMapping/>
+  </p:clrMapOvr>
+</p:sld>
+</file>
+
+<file path=ppt/slides/slide11.xml><?xml version="1.0" encoding="utf-8"?>
+<p:sld xmlns:a="http://schemas.openxmlformats.org/drawingml/2006/main" xmlns:r="http://schemas.openxmlformats.org/officeDocument/2006/relationships" xmlns:p="http://schemas.openxmlformats.org/presentationml/2006/main">
+  <p:cSld>
+    <p:spTree>
+      <p:nvGrpSpPr>
+        <p:cNvPr id="1" name=""/>
+        <p:cNvGrpSpPr/>
+        <p:nvPr/>
+      </p:nvGrpSpPr>
+      <p:grpSpPr>
+        <a:xfrm>
+          <a:off x="0" y="0"/>
+          <a:ext cx="0" cy="0"/>
+          <a:chOff x="0" y="0"/>
+          <a:chExt cx="0" cy="0"/>
+        </a:xfrm>
+      </p:grpSpPr>
+      <p:sp>
+        <p:nvSpPr>
+          <p:cNvPr id="2" name="Title 1">
+            <a:extLst>
+              <a:ext uri="{FF2B5EF4-FFF2-40B4-BE49-F238E27FC236}">
+                <a16:creationId xmlns:a16="http://schemas.microsoft.com/office/drawing/2014/main" id="{164CCB97-A2C3-46A1-B963-05843F1CD803}"/>
+              </a:ext>
+            </a:extLst>
+          </p:cNvPr>
+          <p:cNvSpPr>
+            <a:spLocks noGrp="1"/>
+          </p:cNvSpPr>
+          <p:nvPr>
+            <p:ph type="title"/>
+          </p:nvPr>
+        </p:nvSpPr>
+        <p:spPr/>
+        <p:txBody>
+          <a:bodyPr/>
+          <a:lstStyle/>
+          <a:p>
+            <a:r>
+              <a:rPr lang="en-GB" dirty="0"/>
+              <a:t>Risk Management</a:t>
+            </a:r>
+          </a:p>
+        </p:txBody>
+      </p:sp>
+      <p:sp>
+        <p:nvSpPr>
+          <p:cNvPr id="3" name="Content Placeholder 2">
+            <a:extLst>
+              <a:ext uri="{FF2B5EF4-FFF2-40B4-BE49-F238E27FC236}">
+                <a16:creationId xmlns:a16="http://schemas.microsoft.com/office/drawing/2014/main" id="{ED484593-B512-4BCE-A40B-1D3ED19A4261}"/>
+              </a:ext>
+            </a:extLst>
+          </p:cNvPr>
+          <p:cNvSpPr>
+            <a:spLocks noGrp="1"/>
+          </p:cNvSpPr>
+          <p:nvPr>
+            <p:ph idx="1"/>
+          </p:nvPr>
+        </p:nvSpPr>
+        <p:spPr/>
+        <p:txBody>
+          <a:bodyPr/>
+          <a:lstStyle/>
+          <a:p>
+            <a:r>
+              <a:rPr lang="en-GB" dirty="0"/>
+              <a:t>Hardware issues</a:t>
+            </a:r>
+          </a:p>
+          <a:p>
+            <a:pPr lvl="1"/>
+            <a:r>
+              <a:rPr lang="en-GB" dirty="0"/>
+              <a:t>The hardware I have at my disposal is posing a slight bottleneck to my productivity, however, I’m going to see if the virtual lab stuff can address this problem this weekend.</a:t>
+            </a:r>
+          </a:p>
+          <a:p>
+            <a:r>
+              <a:rPr lang="en-GB" dirty="0"/>
+              <a:t>Maintainability</a:t>
+            </a:r>
+          </a:p>
+          <a:p>
+            <a:pPr lvl="1"/>
+            <a:r>
+              <a:rPr lang="en-GB" dirty="0"/>
+              <a:t>The aforementioned spaghetti monster has already posed a few problems with development, so I shall be getting rid of that as priority #1, and I shall try to improve the quality of my documentation to avoid this happening again</a:t>
+            </a:r>
+          </a:p>
+          <a:p>
+            <a:r>
+              <a:rPr lang="en-GB" dirty="0"/>
+              <a:t>COVID</a:t>
+            </a:r>
+          </a:p>
+          <a:p>
+            <a:pPr lvl="1"/>
+            <a:r>
+              <a:rPr lang="en-GB" dirty="0"/>
+              <a:t>Catching it might make it a bit harder for me to get work done, so I’ve been trying to minimize my chances of catching it.</a:t>
+            </a:r>
+          </a:p>
+        </p:txBody>
+      </p:sp>
+    </p:spTree>
+    <p:extLst>
+      <p:ext uri="{BB962C8B-B14F-4D97-AF65-F5344CB8AC3E}">
+        <p14:creationId xmlns:p14="http://schemas.microsoft.com/office/powerpoint/2010/main" val="2127064633"/>
+      </p:ext>
+    </p:extLst>
+  </p:cSld>
+  <p:clrMapOvr>
+    <a:masterClrMapping/>
+  </p:clrMapOvr>
+</p:sld>
+</file>
+
+<file path=ppt/slides/slide12.xml><?xml version="1.0" encoding="utf-8"?>
+<p:sld xmlns:a="http://schemas.openxmlformats.org/drawingml/2006/main" xmlns:r="http://schemas.openxmlformats.org/officeDocument/2006/relationships" xmlns:p="http://schemas.openxmlformats.org/presentationml/2006/main">
+  <p:cSld>
+    <p:spTree>
+      <p:nvGrpSpPr>
+        <p:cNvPr id="1" name=""/>
+        <p:cNvGrpSpPr/>
+        <p:nvPr/>
+      </p:nvGrpSpPr>
+      <p:grpSpPr>
+        <a:xfrm>
+          <a:off x="0" y="0"/>
+          <a:ext cx="0" cy="0"/>
+          <a:chOff x="0" y="0"/>
+          <a:chExt cx="0" cy="0"/>
+        </a:xfrm>
+      </p:grpSpPr>
+      <p:sp>
+        <p:nvSpPr>
+          <p:cNvPr id="2" name="Title 1">
+            <a:extLst>
+              <a:ext uri="{FF2B5EF4-FFF2-40B4-BE49-F238E27FC236}">
+                <a16:creationId xmlns:a16="http://schemas.microsoft.com/office/drawing/2014/main" id="{79DA0852-1CA8-400D-9948-D178400F4973}"/>
+              </a:ext>
+            </a:extLst>
+          </p:cNvPr>
+          <p:cNvSpPr>
+            <a:spLocks noGrp="1"/>
+          </p:cNvSpPr>
+          <p:nvPr>
+            <p:ph type="title"/>
+          </p:nvPr>
+        </p:nvSpPr>
+        <p:spPr/>
+        <p:txBody>
+          <a:bodyPr/>
+          <a:lstStyle/>
+          <a:p>
+            <a:r>
+              <a:rPr lang="en-GB" dirty="0"/>
+              <a:t>Usage of Gitlab</a:t>
+            </a:r>
+          </a:p>
+        </p:txBody>
+      </p:sp>
+      <p:sp>
+        <p:nvSpPr>
+          <p:cNvPr id="3" name="Content Placeholder 2">
+            <a:extLst>
+              <a:ext uri="{FF2B5EF4-FFF2-40B4-BE49-F238E27FC236}">
+                <a16:creationId xmlns:a16="http://schemas.microsoft.com/office/drawing/2014/main" id="{1FECDC8A-89B2-4DC5-83F5-8EEA42E0375E}"/>
+              </a:ext>
+            </a:extLst>
+          </p:cNvPr>
+          <p:cNvSpPr>
+            <a:spLocks noGrp="1"/>
+          </p:cNvSpPr>
+          <p:nvPr>
+            <p:ph idx="1"/>
+          </p:nvPr>
+        </p:nvSpPr>
+        <p:spPr/>
+        <p:txBody>
+          <a:bodyPr/>
+          <a:lstStyle/>
+          <a:p>
+            <a:r>
+              <a:rPr lang="en-GB" dirty="0"/>
+              <a:t>Everything is on Gitlab.</a:t>
+            </a:r>
+          </a:p>
+          <a:p>
+            <a:r>
+              <a:rPr lang="en-GB" dirty="0"/>
+              <a:t>When I give up for the day/have to leave/etc, I commit my work and push it onto the repo.</a:t>
+            </a:r>
+          </a:p>
+          <a:p>
+            <a:pPr lvl="1"/>
+            <a:r>
+              <a:rPr lang="en-GB" dirty="0"/>
+              <a:t>Currently at &gt;100 commits</a:t>
+            </a:r>
+          </a:p>
+          <a:p>
+            <a:r>
+              <a:rPr lang="en-GB" dirty="0"/>
+              <a:t>I’ve only really used branches as a way of archiving the state of the repo at particular points in time, because I don’t trust myself to keep track of several active branches at once.</a:t>
+            </a:r>
+          </a:p>
+        </p:txBody>
+      </p:sp>
+    </p:spTree>
+    <p:extLst>
+      <p:ext uri="{BB962C8B-B14F-4D97-AF65-F5344CB8AC3E}">
+        <p14:creationId xmlns:p14="http://schemas.microsoft.com/office/powerpoint/2010/main" val="70301375"/>
+      </p:ext>
+    </p:extLst>
+  </p:cSld>
+  <p:clrMapOvr>
+    <a:masterClrMapping/>
+  </p:clrMapOvr>
+</p:sld>
+</file>
+
+<file path=ppt/slides/slide13.xml><?xml version="1.0" encoding="utf-8"?>
+<p:sld xmlns:a="http://schemas.openxmlformats.org/drawingml/2006/main" xmlns:r="http://schemas.openxmlformats.org/officeDocument/2006/relationships" xmlns:p="http://schemas.openxmlformats.org/presentationml/2006/main">
+  <p:cSld>
+    <p:spTree>
+      <p:nvGrpSpPr>
+        <p:cNvPr id="1" name=""/>
+        <p:cNvGrpSpPr/>
+        <p:nvPr/>
+      </p:nvGrpSpPr>
+      <p:grpSpPr>
+        <a:xfrm>
+          <a:off x="0" y="0"/>
+          <a:ext cx="0" cy="0"/>
+          <a:chOff x="0" y="0"/>
+          <a:chExt cx="0" cy="0"/>
+        </a:xfrm>
+      </p:grpSpPr>
+      <p:sp>
+        <p:nvSpPr>
+          <p:cNvPr id="2" name="Title 1">
+            <a:extLst>
+              <a:ext uri="{FF2B5EF4-FFF2-40B4-BE49-F238E27FC236}">
+                <a16:creationId xmlns:a16="http://schemas.microsoft.com/office/drawing/2014/main" id="{11AB9975-6791-4ECB-B592-A52514262655}"/>
+              </a:ext>
+            </a:extLst>
+          </p:cNvPr>
+          <p:cNvSpPr>
+            <a:spLocks noGrp="1"/>
+          </p:cNvSpPr>
+          <p:nvPr>
+            <p:ph type="title"/>
+          </p:nvPr>
+        </p:nvSpPr>
+        <p:spPr/>
+        <p:txBody>
+          <a:bodyPr/>
+          <a:lstStyle/>
+          <a:p>
+            <a:r>
+              <a:rPr lang="en-GB" dirty="0"/>
+              <a:t>Usage of Jira</a:t>
+            </a:r>
+          </a:p>
+        </p:txBody>
+      </p:sp>
+      <p:sp>
+        <p:nvSpPr>
+          <p:cNvPr id="3" name="Content Placeholder 2">
+            <a:extLst>
+              <a:ext uri="{FF2B5EF4-FFF2-40B4-BE49-F238E27FC236}">
+                <a16:creationId xmlns:a16="http://schemas.microsoft.com/office/drawing/2014/main" id="{E2E77E14-B7A2-4CE5-984C-907BD637A4B1}"/>
+              </a:ext>
+            </a:extLst>
+          </p:cNvPr>
+          <p:cNvSpPr>
+            <a:spLocks noGrp="1"/>
+          </p:cNvSpPr>
+          <p:nvPr>
+            <p:ph idx="1"/>
+          </p:nvPr>
+        </p:nvSpPr>
+        <p:spPr/>
+        <p:txBody>
+          <a:bodyPr/>
+          <a:lstStyle/>
+          <a:p>
+            <a:r>
+              <a:rPr lang="en-GB" dirty="0"/>
+              <a:t>I have tried to log work/tasks/etc on Jira as diligently as possible, linking to the appropriate git commit the work I’ve done when logging work</a:t>
+            </a:r>
+          </a:p>
+          <a:p>
+            <a:r>
+              <a:rPr lang="en-GB" dirty="0"/>
+              <a:t>I have been splitting overarching tasks into subtasks, and using epics.</a:t>
+            </a:r>
+          </a:p>
+          <a:p>
+            <a:r>
+              <a:rPr lang="en-GB" dirty="0"/>
+              <a:t>All the summer background prep work issues (all of which are done) have been put into a release, out of the way</a:t>
+            </a:r>
+          </a:p>
+          <a:p>
+            <a:r>
+              <a:rPr lang="en-GB" dirty="0"/>
+              <a:t>Keeping track of statuses of tasks on my Kanban board</a:t>
+            </a:r>
+          </a:p>
+          <a:p>
+            <a:r>
+              <a:rPr lang="en-GB" dirty="0"/>
+              <a:t>Haven’t been using story points, time estimations, and I’ve been inconsistent with my use of priorities and deadlines for tasks.</a:t>
+            </a:r>
+          </a:p>
+        </p:txBody>
+      </p:sp>
+    </p:spTree>
+    <p:extLst>
+      <p:ext uri="{BB962C8B-B14F-4D97-AF65-F5344CB8AC3E}">
+        <p14:creationId xmlns:p14="http://schemas.microsoft.com/office/powerpoint/2010/main" val="2588597299"/>
       </p:ext>
     </p:extLst>
   </p:cSld>
@@ -3504,7 +5520,7 @@
           <p:cNvPr id="2" name="Title 1">
             <a:extLst>
               <a:ext uri="{FF2B5EF4-FFF2-40B4-BE49-F238E27FC236}">
-                <a16:creationId xmlns:a16="http://schemas.microsoft.com/office/drawing/2014/main" id="{FED99857-EEFE-457D-A1CE-72C42DDECC7C}"/>
+                <a16:creationId xmlns:a16="http://schemas.microsoft.com/office/drawing/2014/main" id="{2F1E6446-B9A0-4779-8A1F-671B4F654A07}"/>
               </a:ext>
             </a:extLst>
           </p:cNvPr>
@@ -3522,7 +5538,7 @@
           <a:p>
             <a:r>
               <a:rPr lang="en-GB" dirty="0"/>
-              <a:t>The what/why/why now</a:t>
+              <a:t>What I’ll be covering in this presentation</a:t>
             </a:r>
           </a:p>
         </p:txBody>
@@ -3532,7 +5548,7 @@
           <p:cNvPr id="3" name="Content Placeholder 2">
             <a:extLst>
               <a:ext uri="{FF2B5EF4-FFF2-40B4-BE49-F238E27FC236}">
-                <a16:creationId xmlns:a16="http://schemas.microsoft.com/office/drawing/2014/main" id="{84CE3F6D-40A6-41AC-A706-E6DE7CB4C6F8}"/>
+                <a16:creationId xmlns:a16="http://schemas.microsoft.com/office/drawing/2014/main" id="{9B83323C-3602-44A0-A0F9-0593EAA9BE79}"/>
               </a:ext>
             </a:extLst>
           </p:cNvPr>
@@ -3545,24 +5561,78 @@
         </p:nvSpPr>
         <p:spPr/>
         <p:txBody>
-          <a:bodyPr/>
-          <a:lstStyle/>
-          <a:p>
-            <a:r>
-              <a:rPr lang="en-GB" dirty="0"/>
-              <a:t>What is this</a:t>
+          <a:bodyPr>
+            <a:normAutofit lnSpcReduction="10000"/>
+          </a:bodyPr>
+          <a:lstStyle/>
+          <a:p>
+            <a:r>
+              <a:rPr lang="en-GB" dirty="0"/>
+              <a:t>An overview of the product I’m making</a:t>
+            </a:r>
+          </a:p>
+          <a:p>
+            <a:r>
+              <a:rPr lang="en-GB" dirty="0"/>
+              <a:t>The prep work I did over the summer</a:t>
             </a:r>
           </a:p>
           <a:p>
             <a:pPr lvl="1"/>
             <a:r>
               <a:rPr lang="en-GB" dirty="0"/>
-              <a:t>A system for developing hypertext games, using a </a:t>
-            </a:r>
-            <a:r>
-              <a:rPr lang="en-GB"/>
-              <a:t>declarative language, </a:t>
-            </a:r>
+              <a:t>Quick overview</a:t>
+            </a:r>
+          </a:p>
+          <a:p>
+            <a:pPr lvl="1"/>
+            <a:r>
+              <a:rPr lang="en-GB" dirty="0"/>
+              <a:t>The ‘why/why now/what’s new’ for this project</a:t>
+            </a:r>
+          </a:p>
+          <a:p>
+            <a:r>
+              <a:rPr lang="en-GB" dirty="0"/>
+              <a:t>Challenge Week</a:t>
+            </a:r>
+          </a:p>
+          <a:p>
+            <a:pPr lvl="1"/>
+            <a:r>
+              <a:rPr lang="en-GB" dirty="0"/>
+              <a:t>Goals and Outcomes</a:t>
+            </a:r>
+          </a:p>
+          <a:p>
+            <a:r>
+              <a:rPr lang="en-GB" dirty="0"/>
+              <a:t>Next steps/project management plan</a:t>
+            </a:r>
+          </a:p>
+          <a:p>
+            <a:r>
+              <a:rPr lang="en-GB" dirty="0"/>
+              <a:t>Risk management</a:t>
+            </a:r>
+          </a:p>
+          <a:p>
+            <a:r>
+              <a:rPr lang="en-GB" dirty="0"/>
+              <a:t>Usage of Git/Jira</a:t>
+            </a:r>
+          </a:p>
+          <a:p>
+            <a:r>
+              <a:rPr lang="en-GB" dirty="0"/>
+              <a:t>Questions/live demonstration</a:t>
+            </a:r>
+          </a:p>
+          <a:p>
+            <a:endParaRPr lang="en-GB" dirty="0"/>
+          </a:p>
+          <a:p>
+            <a:pPr lvl="1"/>
             <a:endParaRPr lang="en-GB" dirty="0"/>
           </a:p>
         </p:txBody>
@@ -3570,7 +5640,1084 @@
     </p:spTree>
     <p:extLst>
       <p:ext uri="{BB962C8B-B14F-4D97-AF65-F5344CB8AC3E}">
-        <p14:creationId xmlns:p14="http://schemas.microsoft.com/office/powerpoint/2010/main" val="1578681135"/>
+        <p14:creationId xmlns:p14="http://schemas.microsoft.com/office/powerpoint/2010/main" val="2561028190"/>
+      </p:ext>
+    </p:extLst>
+  </p:cSld>
+  <p:clrMapOvr>
+    <a:masterClrMapping/>
+  </p:clrMapOvr>
+</p:sld>
+</file>
+
+<file path=ppt/slides/slide3.xml><?xml version="1.0" encoding="utf-8"?>
+<p:sld xmlns:a="http://schemas.openxmlformats.org/drawingml/2006/main" xmlns:r="http://schemas.openxmlformats.org/officeDocument/2006/relationships" xmlns:p="http://schemas.openxmlformats.org/presentationml/2006/main">
+  <p:cSld>
+    <p:spTree>
+      <p:nvGrpSpPr>
+        <p:cNvPr id="1" name=""/>
+        <p:cNvGrpSpPr/>
+        <p:nvPr/>
+      </p:nvGrpSpPr>
+      <p:grpSpPr>
+        <a:xfrm>
+          <a:off x="0" y="0"/>
+          <a:ext cx="0" cy="0"/>
+          <a:chOff x="0" y="0"/>
+          <a:chExt cx="0" cy="0"/>
+        </a:xfrm>
+      </p:grpSpPr>
+      <p:sp>
+        <p:nvSpPr>
+          <p:cNvPr id="2" name="Title 1">
+            <a:extLst>
+              <a:ext uri="{FF2B5EF4-FFF2-40B4-BE49-F238E27FC236}">
+                <a16:creationId xmlns:a16="http://schemas.microsoft.com/office/drawing/2014/main" id="{ACE0EAC1-F1BB-4C4D-9B15-66CF5A15E613}"/>
+              </a:ext>
+            </a:extLst>
+          </p:cNvPr>
+          <p:cNvSpPr>
+            <a:spLocks noGrp="1"/>
+          </p:cNvSpPr>
+          <p:nvPr>
+            <p:ph type="title"/>
+          </p:nvPr>
+        </p:nvSpPr>
+        <p:spPr/>
+        <p:txBody>
+          <a:bodyPr/>
+          <a:lstStyle/>
+          <a:p>
+            <a:r>
+              <a:rPr lang="en-GB" dirty="0"/>
+              <a:t>What I’m making – HECC-IT</a:t>
+            </a:r>
+          </a:p>
+        </p:txBody>
+      </p:sp>
+      <p:sp>
+        <p:nvSpPr>
+          <p:cNvPr id="3" name="Content Placeholder 2">
+            <a:extLst>
+              <a:ext uri="{FF2B5EF4-FFF2-40B4-BE49-F238E27FC236}">
+                <a16:creationId xmlns:a16="http://schemas.microsoft.com/office/drawing/2014/main" id="{ED233C0A-28BB-44C4-A03A-A172AC23001B}"/>
+              </a:ext>
+            </a:extLst>
+          </p:cNvPr>
+          <p:cNvSpPr>
+            <a:spLocks noGrp="1"/>
+          </p:cNvSpPr>
+          <p:nvPr>
+            <p:ph idx="1"/>
+          </p:nvPr>
+        </p:nvSpPr>
+        <p:spPr/>
+        <p:txBody>
+          <a:bodyPr>
+            <a:noAutofit/>
+          </a:bodyPr>
+          <a:lstStyle/>
+          <a:p>
+            <a:r>
+              <a:rPr lang="en-GB" b="1" dirty="0"/>
+              <a:t>HECC-IT</a:t>
+            </a:r>
+            <a:r>
+              <a:rPr lang="en-GB" dirty="0"/>
+              <a:t> (HECC Integrated Toolkit): toolkit for making hypertext games</a:t>
+            </a:r>
+          </a:p>
+          <a:p>
+            <a:pPr lvl="1"/>
+            <a:r>
+              <a:rPr lang="en-GB" b="1" dirty="0"/>
+              <a:t>HECC </a:t>
+            </a:r>
+            <a:r>
+              <a:rPr lang="en-GB" dirty="0"/>
+              <a:t>(Hypertext Editing and Creation Code)</a:t>
+            </a:r>
+          </a:p>
+          <a:p>
+            <a:pPr lvl="2"/>
+            <a:r>
+              <a:rPr lang="en-GB" dirty="0"/>
+              <a:t>Declarative language for writing hypertext games, used with these tools</a:t>
+            </a:r>
+          </a:p>
+          <a:p>
+            <a:pPr lvl="1"/>
+            <a:r>
+              <a:rPr lang="en-GB" b="1" dirty="0"/>
+              <a:t>HECC-UP</a:t>
+            </a:r>
+            <a:r>
+              <a:rPr lang="en-GB" dirty="0"/>
+              <a:t> (HECC Ultra Parser)</a:t>
+            </a:r>
+          </a:p>
+          <a:p>
+            <a:pPr lvl="2"/>
+            <a:r>
+              <a:rPr lang="en-GB" dirty="0"/>
+              <a:t>Takes HECC file as an input, exports the HECCIN Game defined by the given HECC file</a:t>
+            </a:r>
+          </a:p>
+          <a:p>
+            <a:pPr lvl="1"/>
+            <a:r>
+              <a:rPr lang="en-GB" b="1" dirty="0"/>
+              <a:t>OH-HECC</a:t>
+            </a:r>
+            <a:r>
+              <a:rPr lang="en-GB" dirty="0"/>
+              <a:t> (Optional Help for HECC)</a:t>
+            </a:r>
+          </a:p>
+          <a:p>
+            <a:pPr lvl="2"/>
+            <a:r>
+              <a:rPr lang="en-GB" dirty="0"/>
+              <a:t>Visual editor for HECC code</a:t>
+            </a:r>
+          </a:p>
+          <a:p>
+            <a:r>
+              <a:rPr lang="en-GB" b="1" dirty="0"/>
+              <a:t>HECCIN Game </a:t>
+            </a:r>
+            <a:r>
+              <a:rPr lang="en-GB" dirty="0"/>
+              <a:t>(HECC-Infused Nice Game): The exported game</a:t>
+            </a:r>
+          </a:p>
+          <a:p>
+            <a:pPr lvl="1"/>
+            <a:r>
+              <a:rPr lang="en-GB" b="1" dirty="0"/>
+              <a:t>Index.html</a:t>
+            </a:r>
+            <a:endParaRPr lang="en-GB" dirty="0"/>
+          </a:p>
+          <a:p>
+            <a:pPr lvl="1"/>
+            <a:r>
+              <a:rPr lang="en-GB" b="1" dirty="0"/>
+              <a:t>heccer.js</a:t>
+            </a:r>
+            <a:r>
+              <a:rPr lang="en-GB" dirty="0"/>
+              <a:t>: the engine that runs the game.</a:t>
+            </a:r>
+            <a:endParaRPr lang="en-GB" b="1" dirty="0"/>
+          </a:p>
+          <a:p>
+            <a:pPr lvl="1"/>
+            <a:r>
+              <a:rPr lang="en-GB" b="1" dirty="0"/>
+              <a:t>hecced.js</a:t>
+            </a:r>
+            <a:r>
+              <a:rPr lang="en-GB" dirty="0"/>
+              <a:t>: the game data (produced from the HECC file).</a:t>
+            </a:r>
+            <a:endParaRPr lang="en-GB" b="1" dirty="0"/>
+          </a:p>
+        </p:txBody>
+      </p:sp>
+    </p:spTree>
+    <p:extLst>
+      <p:ext uri="{BB962C8B-B14F-4D97-AF65-F5344CB8AC3E}">
+        <p14:creationId xmlns:p14="http://schemas.microsoft.com/office/powerpoint/2010/main" val="2596281665"/>
+      </p:ext>
+    </p:extLst>
+  </p:cSld>
+  <p:clrMapOvr>
+    <a:masterClrMapping/>
+  </p:clrMapOvr>
+</p:sld>
+</file>
+
+<file path=ppt/slides/slide4.xml><?xml version="1.0" encoding="utf-8"?>
+<p:sld xmlns:a="http://schemas.openxmlformats.org/drawingml/2006/main" xmlns:r="http://schemas.openxmlformats.org/officeDocument/2006/relationships" xmlns:p="http://schemas.openxmlformats.org/presentationml/2006/main">
+  <p:cSld>
+    <p:spTree>
+      <p:nvGrpSpPr>
+        <p:cNvPr id="1" name=""/>
+        <p:cNvGrpSpPr/>
+        <p:nvPr/>
+      </p:nvGrpSpPr>
+      <p:grpSpPr>
+        <a:xfrm>
+          <a:off x="0" y="0"/>
+          <a:ext cx="0" cy="0"/>
+          <a:chOff x="0" y="0"/>
+          <a:chExt cx="0" cy="0"/>
+        </a:xfrm>
+      </p:grpSpPr>
+      <p:pic>
+        <p:nvPicPr>
+          <p:cNvPr id="5" name="Content Placeholder 4">
+            <a:extLst>
+              <a:ext uri="{FF2B5EF4-FFF2-40B4-BE49-F238E27FC236}">
+                <a16:creationId xmlns:a16="http://schemas.microsoft.com/office/drawing/2014/main" id="{1543EBC8-C28E-4AE4-BA62-C21FE2CB5D18}"/>
+              </a:ext>
+            </a:extLst>
+          </p:cNvPr>
+          <p:cNvPicPr>
+            <a:picLocks noGrp="1" noChangeAspect="1"/>
+          </p:cNvPicPr>
+          <p:nvPr>
+            <p:ph idx="1"/>
+          </p:nvPr>
+        </p:nvPicPr>
+        <p:blipFill>
+          <a:blip r:embed="rId2">
+            <a:extLst>
+              <a:ext uri="{28A0092B-C50C-407E-A947-70E740481C1C}">
+                <a14:useLocalDpi xmlns:a14="http://schemas.microsoft.com/office/drawing/2010/main" val="0"/>
+              </a:ext>
+            </a:extLst>
+          </a:blip>
+          <a:stretch>
+            <a:fillRect/>
+          </a:stretch>
+        </p:blipFill>
+        <p:spPr>
+          <a:xfrm>
+            <a:off x="2284606" y="489991"/>
+            <a:ext cx="7622788" cy="5878017"/>
+          </a:xfrm>
+        </p:spPr>
+      </p:pic>
+    </p:spTree>
+    <p:extLst>
+      <p:ext uri="{BB962C8B-B14F-4D97-AF65-F5344CB8AC3E}">
+        <p14:creationId xmlns:p14="http://schemas.microsoft.com/office/powerpoint/2010/main" val="3927840763"/>
+      </p:ext>
+    </p:extLst>
+  </p:cSld>
+  <p:clrMapOvr>
+    <a:masterClrMapping/>
+  </p:clrMapOvr>
+</p:sld>
+</file>
+
+<file path=ppt/slides/slide5.xml><?xml version="1.0" encoding="utf-8"?>
+<p:sld xmlns:a="http://schemas.openxmlformats.org/drawingml/2006/main" xmlns:r="http://schemas.openxmlformats.org/officeDocument/2006/relationships" xmlns:p="http://schemas.openxmlformats.org/presentationml/2006/main">
+  <p:cSld>
+    <p:spTree>
+      <p:nvGrpSpPr>
+        <p:cNvPr id="1" name=""/>
+        <p:cNvGrpSpPr/>
+        <p:nvPr/>
+      </p:nvGrpSpPr>
+      <p:grpSpPr>
+        <a:xfrm>
+          <a:off x="0" y="0"/>
+          <a:ext cx="0" cy="0"/>
+          <a:chOff x="0" y="0"/>
+          <a:chExt cx="0" cy="0"/>
+        </a:xfrm>
+      </p:grpSpPr>
+      <p:sp>
+        <p:nvSpPr>
+          <p:cNvPr id="2" name="Title 1">
+            <a:extLst>
+              <a:ext uri="{FF2B5EF4-FFF2-40B4-BE49-F238E27FC236}">
+                <a16:creationId xmlns:a16="http://schemas.microsoft.com/office/drawing/2014/main" id="{7822CEE8-C199-485A-ADFC-F49FC10EA06A}"/>
+              </a:ext>
+            </a:extLst>
+          </p:cNvPr>
+          <p:cNvSpPr>
+            <a:spLocks noGrp="1"/>
+          </p:cNvSpPr>
+          <p:nvPr>
+            <p:ph type="title"/>
+          </p:nvPr>
+        </p:nvSpPr>
+        <p:spPr/>
+        <p:txBody>
+          <a:bodyPr/>
+          <a:lstStyle/>
+          <a:p>
+            <a:r>
+              <a:rPr lang="en-GB" dirty="0"/>
+              <a:t>Prep work over the summer</a:t>
+            </a:r>
+          </a:p>
+        </p:txBody>
+      </p:sp>
+      <p:sp>
+        <p:nvSpPr>
+          <p:cNvPr id="3" name="Content Placeholder 2">
+            <a:extLst>
+              <a:ext uri="{FF2B5EF4-FFF2-40B4-BE49-F238E27FC236}">
+                <a16:creationId xmlns:a16="http://schemas.microsoft.com/office/drawing/2014/main" id="{39FCC544-6523-4F92-9C79-BFC971122D25}"/>
+              </a:ext>
+            </a:extLst>
+          </p:cNvPr>
+          <p:cNvSpPr>
+            <a:spLocks noGrp="1"/>
+          </p:cNvSpPr>
+          <p:nvPr>
+            <p:ph idx="1"/>
+          </p:nvPr>
+        </p:nvSpPr>
+        <p:spPr/>
+        <p:txBody>
+          <a:bodyPr>
+            <a:normAutofit/>
+          </a:bodyPr>
+          <a:lstStyle/>
+          <a:p>
+            <a:r>
+              <a:rPr lang="en-GB" dirty="0"/>
+              <a:t>Initial plan</a:t>
+            </a:r>
+          </a:p>
+          <a:p>
+            <a:pPr lvl="1"/>
+            <a:r>
+              <a:rPr lang="en-GB" dirty="0"/>
+              <a:t>Look at existing hypertext game tools, work out how they work, and use that to guide the design of my tool</a:t>
+            </a:r>
+          </a:p>
+          <a:p>
+            <a:r>
+              <a:rPr lang="en-GB" dirty="0"/>
+              <a:t>A few changes were made to that plan</a:t>
+            </a:r>
+          </a:p>
+          <a:p>
+            <a:pPr lvl="1"/>
+            <a:r>
+              <a:rPr lang="en-GB" dirty="0"/>
+              <a:t>Found out about the ‘Treaty of Babel’ standard for Interactive Fiction</a:t>
+            </a:r>
+          </a:p>
+          <a:p>
+            <a:pPr lvl="1"/>
+            <a:r>
+              <a:rPr lang="en-GB" dirty="0"/>
+              <a:t>Started to implement a prototype version of my tool whilst I was trying to plan how it would work</a:t>
+            </a:r>
+          </a:p>
+          <a:p>
+            <a:pPr lvl="1"/>
+            <a:r>
+              <a:rPr lang="en-GB" dirty="0"/>
+              <a:t>Realized that I needed to look at some academic literature and some existing hypertext games as well</a:t>
+            </a:r>
+          </a:p>
+          <a:p>
+            <a:pPr lvl="1"/>
+            <a:r>
+              <a:rPr lang="en-GB" dirty="0"/>
+              <a:t>Decided to produce the ‘summary of background reading’ document as well before the start of term</a:t>
+            </a:r>
+          </a:p>
+          <a:p>
+            <a:pPr lvl="1"/>
+            <a:endParaRPr lang="en-GB" dirty="0"/>
+          </a:p>
+        </p:txBody>
+      </p:sp>
+    </p:spTree>
+    <p:extLst>
+      <p:ext uri="{BB962C8B-B14F-4D97-AF65-F5344CB8AC3E}">
+        <p14:creationId xmlns:p14="http://schemas.microsoft.com/office/powerpoint/2010/main" val="738980662"/>
+      </p:ext>
+    </p:extLst>
+  </p:cSld>
+  <p:clrMapOvr>
+    <a:masterClrMapping/>
+  </p:clrMapOvr>
+</p:sld>
+</file>
+
+<file path=ppt/slides/slide6.xml><?xml version="1.0" encoding="utf-8"?>
+<p:sld xmlns:a="http://schemas.openxmlformats.org/drawingml/2006/main" xmlns:r="http://schemas.openxmlformats.org/officeDocument/2006/relationships" xmlns:p="http://schemas.openxmlformats.org/presentationml/2006/main">
+  <p:cSld>
+    <p:spTree>
+      <p:nvGrpSpPr>
+        <p:cNvPr id="1" name=""/>
+        <p:cNvGrpSpPr/>
+        <p:nvPr/>
+      </p:nvGrpSpPr>
+      <p:grpSpPr>
+        <a:xfrm>
+          <a:off x="0" y="0"/>
+          <a:ext cx="0" cy="0"/>
+          <a:chOff x="0" y="0"/>
+          <a:chExt cx="0" cy="0"/>
+        </a:xfrm>
+      </p:grpSpPr>
+      <p:sp>
+        <p:nvSpPr>
+          <p:cNvPr id="15" name="Text Placeholder 14">
+            <a:extLst>
+              <a:ext uri="{FF2B5EF4-FFF2-40B4-BE49-F238E27FC236}">
+                <a16:creationId xmlns:a16="http://schemas.microsoft.com/office/drawing/2014/main" id="{723C954C-CDEC-47B1-BD57-0B08DF27E63F}"/>
+              </a:ext>
+            </a:extLst>
+          </p:cNvPr>
+          <p:cNvSpPr>
+            <a:spLocks noGrp="1"/>
+          </p:cNvSpPr>
+          <p:nvPr>
+            <p:ph type="body" idx="1"/>
+          </p:nvPr>
+        </p:nvSpPr>
+        <p:spPr>
+          <a:xfrm>
+            <a:off x="839786" y="395583"/>
+            <a:ext cx="3502800" cy="769440"/>
+          </a:xfrm>
+        </p:spPr>
+        <p:txBody>
+          <a:bodyPr>
+            <a:normAutofit/>
+          </a:bodyPr>
+          <a:lstStyle/>
+          <a:p>
+            <a:r>
+              <a:rPr lang="en-GB" dirty="0"/>
+              <a:t>Why am I doing this project?</a:t>
+            </a:r>
+          </a:p>
+        </p:txBody>
+      </p:sp>
+      <p:sp>
+        <p:nvSpPr>
+          <p:cNvPr id="16" name="Content Placeholder 15">
+            <a:extLst>
+              <a:ext uri="{FF2B5EF4-FFF2-40B4-BE49-F238E27FC236}">
+                <a16:creationId xmlns:a16="http://schemas.microsoft.com/office/drawing/2014/main" id="{FC85EC69-24F2-4A9C-AF42-79B6E029B681}"/>
+              </a:ext>
+            </a:extLst>
+          </p:cNvPr>
+          <p:cNvSpPr>
+            <a:spLocks noGrp="1"/>
+          </p:cNvSpPr>
+          <p:nvPr>
+            <p:ph sz="half" idx="2"/>
+          </p:nvPr>
+        </p:nvSpPr>
+        <p:spPr>
+          <a:xfrm>
+            <a:off x="839788" y="1165023"/>
+            <a:ext cx="3502800" cy="4832091"/>
+          </a:xfrm>
+        </p:spPr>
+        <p:txBody>
+          <a:bodyPr/>
+          <a:lstStyle/>
+          <a:p>
+            <a:r>
+              <a:rPr lang="en-GB" dirty="0"/>
+              <a:t>I like making things that others can play around with</a:t>
+            </a:r>
+          </a:p>
+          <a:p>
+            <a:r>
+              <a:rPr lang="en-GB" dirty="0"/>
+              <a:t>Doesn’t involve any specialized hardware/software</a:t>
+            </a:r>
+          </a:p>
+          <a:p>
+            <a:r>
+              <a:rPr lang="en-GB" dirty="0"/>
+              <a:t>Might actually be of some use to somebody</a:t>
+            </a:r>
+          </a:p>
+          <a:p>
+            <a:endParaRPr lang="en-GB" dirty="0"/>
+          </a:p>
+        </p:txBody>
+      </p:sp>
+      <p:sp>
+        <p:nvSpPr>
+          <p:cNvPr id="17" name="Text Placeholder 16">
+            <a:extLst>
+              <a:ext uri="{FF2B5EF4-FFF2-40B4-BE49-F238E27FC236}">
+                <a16:creationId xmlns:a16="http://schemas.microsoft.com/office/drawing/2014/main" id="{A7C7FAB9-4CFD-4651-B2E8-C0B1B632D3F3}"/>
+              </a:ext>
+            </a:extLst>
+          </p:cNvPr>
+          <p:cNvSpPr>
+            <a:spLocks noGrp="1"/>
+          </p:cNvSpPr>
+          <p:nvPr>
+            <p:ph type="body" sz="quarter" idx="3"/>
+          </p:nvPr>
+        </p:nvSpPr>
+        <p:spPr>
+          <a:xfrm>
+            <a:off x="4342587" y="395585"/>
+            <a:ext cx="3502800" cy="769440"/>
+          </a:xfrm>
+        </p:spPr>
+        <p:txBody>
+          <a:bodyPr>
+            <a:normAutofit/>
+          </a:bodyPr>
+          <a:lstStyle/>
+          <a:p>
+            <a:r>
+              <a:rPr lang="en-GB" dirty="0"/>
+              <a:t>Why am I doing this now?</a:t>
+            </a:r>
+          </a:p>
+        </p:txBody>
+      </p:sp>
+      <p:sp>
+        <p:nvSpPr>
+          <p:cNvPr id="18" name="Content Placeholder 17">
+            <a:extLst>
+              <a:ext uri="{FF2B5EF4-FFF2-40B4-BE49-F238E27FC236}">
+                <a16:creationId xmlns:a16="http://schemas.microsoft.com/office/drawing/2014/main" id="{A11B7E63-284A-45E6-9671-CA2FBCD2EFBC}"/>
+              </a:ext>
+            </a:extLst>
+          </p:cNvPr>
+          <p:cNvSpPr>
+            <a:spLocks noGrp="1"/>
+          </p:cNvSpPr>
+          <p:nvPr>
+            <p:ph sz="quarter" idx="4"/>
+          </p:nvPr>
+        </p:nvSpPr>
+        <p:spPr>
+          <a:xfrm>
+            <a:off x="4342585" y="1165024"/>
+            <a:ext cx="3502800" cy="4832091"/>
+          </a:xfrm>
+        </p:spPr>
+        <p:txBody>
+          <a:bodyPr/>
+          <a:lstStyle/>
+          <a:p>
+            <a:r>
+              <a:rPr lang="en-GB" dirty="0"/>
+              <a:t>I guess I might be able to use this tool as a decent outlet for some stuff I’ve had on my chest for some time.</a:t>
+            </a:r>
+          </a:p>
+        </p:txBody>
+      </p:sp>
+      <p:sp>
+        <p:nvSpPr>
+          <p:cNvPr id="8" name="TextBox 7">
+            <a:extLst>
+              <a:ext uri="{FF2B5EF4-FFF2-40B4-BE49-F238E27FC236}">
+                <a16:creationId xmlns:a16="http://schemas.microsoft.com/office/drawing/2014/main" id="{9878DE24-842E-4F83-8563-9997359D143E}"/>
+              </a:ext>
+            </a:extLst>
+          </p:cNvPr>
+          <p:cNvSpPr txBox="1"/>
+          <p:nvPr/>
+        </p:nvSpPr>
+        <p:spPr>
+          <a:xfrm>
+            <a:off x="7845382" y="1165023"/>
+            <a:ext cx="3502800" cy="4832092"/>
+          </a:xfrm>
+          <a:prstGeom prst="rect">
+            <a:avLst/>
+          </a:prstGeom>
+          <a:noFill/>
+        </p:spPr>
+        <p:txBody>
+          <a:bodyPr wrap="square" rtlCol="0">
+            <a:spAutoFit/>
+          </a:bodyPr>
+          <a:lstStyle/>
+          <a:p>
+            <a:pPr marL="285750" indent="-285750">
+              <a:buFont typeface="Arial" panose="020B0604020202020204" pitchFamily="34" charset="0"/>
+              <a:buChar char="•"/>
+            </a:pPr>
+            <a:r>
+              <a:rPr lang="en-GB" sz="2800" dirty="0"/>
+              <a:t>This system will allow users to easily swap between using a visual editor and editing the raw data manually, at will, without needing to go through any longwinded conversion processes.</a:t>
+            </a:r>
+          </a:p>
+        </p:txBody>
+      </p:sp>
+      <p:sp>
+        <p:nvSpPr>
+          <p:cNvPr id="19" name="TextBox 18">
+            <a:extLst>
+              <a:ext uri="{FF2B5EF4-FFF2-40B4-BE49-F238E27FC236}">
+                <a16:creationId xmlns:a16="http://schemas.microsoft.com/office/drawing/2014/main" id="{46CA8F74-A661-47BA-AFDF-DC576A50E49B}"/>
+              </a:ext>
+            </a:extLst>
+          </p:cNvPr>
+          <p:cNvSpPr txBox="1"/>
+          <p:nvPr/>
+        </p:nvSpPr>
+        <p:spPr>
+          <a:xfrm>
+            <a:off x="7845386" y="395584"/>
+            <a:ext cx="3502800" cy="769441"/>
+          </a:xfrm>
+          <a:prstGeom prst="rect">
+            <a:avLst/>
+          </a:prstGeom>
+          <a:noFill/>
+        </p:spPr>
+        <p:txBody>
+          <a:bodyPr wrap="square" rtlCol="0">
+            <a:spAutoFit/>
+          </a:bodyPr>
+          <a:lstStyle/>
+          <a:p>
+            <a:r>
+              <a:rPr lang="en-GB" sz="2200" b="1" dirty="0"/>
+              <a:t>What can I bring to the table that nobody else has?</a:t>
+            </a:r>
+          </a:p>
+        </p:txBody>
+      </p:sp>
+    </p:spTree>
+    <p:extLst>
+      <p:ext uri="{BB962C8B-B14F-4D97-AF65-F5344CB8AC3E}">
+        <p14:creationId xmlns:p14="http://schemas.microsoft.com/office/powerpoint/2010/main" val="2928737561"/>
+      </p:ext>
+    </p:extLst>
+  </p:cSld>
+  <p:clrMapOvr>
+    <a:masterClrMapping/>
+  </p:clrMapOvr>
+</p:sld>
+</file>
+
+<file path=ppt/slides/slide7.xml><?xml version="1.0" encoding="utf-8"?>
+<p:sld xmlns:a="http://schemas.openxmlformats.org/drawingml/2006/main" xmlns:r="http://schemas.openxmlformats.org/officeDocument/2006/relationships" xmlns:p="http://schemas.openxmlformats.org/presentationml/2006/main">
+  <p:cSld>
+    <p:spTree>
+      <p:nvGrpSpPr>
+        <p:cNvPr id="1" name=""/>
+        <p:cNvGrpSpPr/>
+        <p:nvPr/>
+      </p:nvGrpSpPr>
+      <p:grpSpPr>
+        <a:xfrm>
+          <a:off x="0" y="0"/>
+          <a:ext cx="0" cy="0"/>
+          <a:chOff x="0" y="0"/>
+          <a:chExt cx="0" cy="0"/>
+        </a:xfrm>
+      </p:grpSpPr>
+      <p:sp>
+        <p:nvSpPr>
+          <p:cNvPr id="2" name="Title 1">
+            <a:extLst>
+              <a:ext uri="{FF2B5EF4-FFF2-40B4-BE49-F238E27FC236}">
+                <a16:creationId xmlns:a16="http://schemas.microsoft.com/office/drawing/2014/main" id="{3057F0C6-F80A-4F5F-AB7C-4F9F5D0D25F8}"/>
+              </a:ext>
+            </a:extLst>
+          </p:cNvPr>
+          <p:cNvSpPr>
+            <a:spLocks noGrp="1"/>
+          </p:cNvSpPr>
+          <p:nvPr>
+            <p:ph type="title"/>
+          </p:nvPr>
+        </p:nvSpPr>
+        <p:spPr/>
+        <p:txBody>
+          <a:bodyPr/>
+          <a:lstStyle/>
+          <a:p>
+            <a:r>
+              <a:rPr lang="en-GB" dirty="0"/>
+              <a:t>Challenge Week - goals</a:t>
+            </a:r>
+          </a:p>
+        </p:txBody>
+      </p:sp>
+      <p:sp>
+        <p:nvSpPr>
+          <p:cNvPr id="3" name="Content Placeholder 2">
+            <a:extLst>
+              <a:ext uri="{FF2B5EF4-FFF2-40B4-BE49-F238E27FC236}">
+                <a16:creationId xmlns:a16="http://schemas.microsoft.com/office/drawing/2014/main" id="{38759F59-42AA-404B-89FA-97AB73B333B1}"/>
+              </a:ext>
+            </a:extLst>
+          </p:cNvPr>
+          <p:cNvSpPr>
+            <a:spLocks noGrp="1"/>
+          </p:cNvSpPr>
+          <p:nvPr>
+            <p:ph idx="1"/>
+          </p:nvPr>
+        </p:nvSpPr>
+        <p:spPr/>
+        <p:txBody>
+          <a:bodyPr>
+            <a:normAutofit lnSpcReduction="10000"/>
+          </a:bodyPr>
+          <a:lstStyle/>
+          <a:p>
+            <a:r>
+              <a:rPr lang="en-GB" dirty="0"/>
+              <a:t>Encapsulate the metadata processing code into a Metadata object</a:t>
+            </a:r>
+          </a:p>
+          <a:p>
+            <a:r>
+              <a:rPr lang="en-GB" dirty="0"/>
+              <a:t>Ensure my metadata is compliant with the Treaty of Babel standard</a:t>
+            </a:r>
+          </a:p>
+          <a:p>
+            <a:r>
+              <a:rPr lang="en-GB" dirty="0"/>
+              <a:t>Improve the default appearance of index.html</a:t>
+            </a:r>
+          </a:p>
+          <a:p>
+            <a:r>
+              <a:rPr lang="en-GB" dirty="0"/>
+              <a:t>Produce a GUI for HECC-UP</a:t>
+            </a:r>
+          </a:p>
+          <a:p>
+            <a:r>
+              <a:rPr lang="en-GB" dirty="0"/>
+              <a:t>Make a markdown parser within HECC-UP (permitting markdown formatting)</a:t>
+            </a:r>
+          </a:p>
+          <a:p>
+            <a:r>
+              <a:rPr lang="en-GB" dirty="0"/>
+              <a:t>Make HECC-UP escape any special HTML characters in the input</a:t>
+            </a:r>
+          </a:p>
+          <a:p>
+            <a:r>
+              <a:rPr lang="en-GB" dirty="0"/>
+              <a:t>Produce this presentation</a:t>
+            </a:r>
+          </a:p>
+          <a:p>
+            <a:r>
+              <a:rPr lang="en-GB" dirty="0"/>
+              <a:t>Incorporate some unit tests into HECC-UP</a:t>
+            </a:r>
+          </a:p>
+          <a:p>
+            <a:pPr lvl="1"/>
+            <a:endParaRPr lang="en-GB" dirty="0"/>
+          </a:p>
+        </p:txBody>
+      </p:sp>
+    </p:spTree>
+    <p:extLst>
+      <p:ext uri="{BB962C8B-B14F-4D97-AF65-F5344CB8AC3E}">
+        <p14:creationId xmlns:p14="http://schemas.microsoft.com/office/powerpoint/2010/main" val="800657811"/>
+      </p:ext>
+    </p:extLst>
+  </p:cSld>
+  <p:clrMapOvr>
+    <a:masterClrMapping/>
+  </p:clrMapOvr>
+</p:sld>
+</file>
+
+<file path=ppt/slides/slide8.xml><?xml version="1.0" encoding="utf-8"?>
+<p:sld xmlns:a="http://schemas.openxmlformats.org/drawingml/2006/main" xmlns:r="http://schemas.openxmlformats.org/officeDocument/2006/relationships" xmlns:p="http://schemas.openxmlformats.org/presentationml/2006/main">
+  <p:cSld>
+    <p:spTree>
+      <p:nvGrpSpPr>
+        <p:cNvPr id="1" name=""/>
+        <p:cNvGrpSpPr/>
+        <p:nvPr/>
+      </p:nvGrpSpPr>
+      <p:grpSpPr>
+        <a:xfrm>
+          <a:off x="0" y="0"/>
+          <a:ext cx="0" cy="0"/>
+          <a:chOff x="0" y="0"/>
+          <a:chExt cx="0" cy="0"/>
+        </a:xfrm>
+      </p:grpSpPr>
+      <p:sp>
+        <p:nvSpPr>
+          <p:cNvPr id="2" name="Title 1">
+            <a:extLst>
+              <a:ext uri="{FF2B5EF4-FFF2-40B4-BE49-F238E27FC236}">
+                <a16:creationId xmlns:a16="http://schemas.microsoft.com/office/drawing/2014/main" id="{D97A06FC-D6A8-4ACA-B0C3-4A61D4827272}"/>
+              </a:ext>
+            </a:extLst>
+          </p:cNvPr>
+          <p:cNvSpPr>
+            <a:spLocks noGrp="1"/>
+          </p:cNvSpPr>
+          <p:nvPr>
+            <p:ph type="title"/>
+          </p:nvPr>
+        </p:nvSpPr>
+        <p:spPr/>
+        <p:txBody>
+          <a:bodyPr/>
+          <a:lstStyle/>
+          <a:p>
+            <a:r>
+              <a:rPr lang="en-GB" dirty="0"/>
+              <a:t>Challenge Week – status of the goals</a:t>
+            </a:r>
+          </a:p>
+        </p:txBody>
+      </p:sp>
+      <p:sp>
+        <p:nvSpPr>
+          <p:cNvPr id="3" name="Text Placeholder 2">
+            <a:extLst>
+              <a:ext uri="{FF2B5EF4-FFF2-40B4-BE49-F238E27FC236}">
+                <a16:creationId xmlns:a16="http://schemas.microsoft.com/office/drawing/2014/main" id="{DC8AF8D4-9234-41EC-85F8-F216B1F5C90D}"/>
+              </a:ext>
+            </a:extLst>
+          </p:cNvPr>
+          <p:cNvSpPr>
+            <a:spLocks noGrp="1"/>
+          </p:cNvSpPr>
+          <p:nvPr>
+            <p:ph type="body" idx="1"/>
+          </p:nvPr>
+        </p:nvSpPr>
+        <p:spPr/>
+        <p:txBody>
+          <a:bodyPr/>
+          <a:lstStyle/>
+          <a:p>
+            <a:r>
+              <a:rPr lang="en-GB" dirty="0"/>
+              <a:t>Successes</a:t>
+            </a:r>
+          </a:p>
+        </p:txBody>
+      </p:sp>
+      <p:sp>
+        <p:nvSpPr>
+          <p:cNvPr id="4" name="Content Placeholder 3">
+            <a:extLst>
+              <a:ext uri="{FF2B5EF4-FFF2-40B4-BE49-F238E27FC236}">
+                <a16:creationId xmlns:a16="http://schemas.microsoft.com/office/drawing/2014/main" id="{2625298C-F16D-4A3E-A134-54124E08BB39}"/>
+              </a:ext>
+            </a:extLst>
+          </p:cNvPr>
+          <p:cNvSpPr>
+            <a:spLocks noGrp="1"/>
+          </p:cNvSpPr>
+          <p:nvPr>
+            <p:ph sz="half" idx="2"/>
+          </p:nvPr>
+        </p:nvSpPr>
+        <p:spPr/>
+        <p:txBody>
+          <a:bodyPr/>
+          <a:lstStyle/>
+          <a:p>
+            <a:r>
+              <a:rPr lang="en-GB" dirty="0"/>
+              <a:t>Metadata</a:t>
+            </a:r>
+          </a:p>
+          <a:p>
+            <a:r>
+              <a:rPr lang="en-GB" dirty="0"/>
+              <a:t>Improving index.html</a:t>
+            </a:r>
+          </a:p>
+          <a:p>
+            <a:r>
+              <a:rPr lang="en-GB" dirty="0"/>
+              <a:t>GUI</a:t>
+            </a:r>
+          </a:p>
+          <a:p>
+            <a:r>
+              <a:rPr lang="en-GB" dirty="0"/>
+              <a:t>Escape characters</a:t>
+            </a:r>
+          </a:p>
+          <a:p>
+            <a:r>
+              <a:rPr lang="en-GB" dirty="0"/>
+              <a:t>Producing this presentation</a:t>
+            </a:r>
+          </a:p>
+        </p:txBody>
+      </p:sp>
+      <p:sp>
+        <p:nvSpPr>
+          <p:cNvPr id="5" name="Text Placeholder 4">
+            <a:extLst>
+              <a:ext uri="{FF2B5EF4-FFF2-40B4-BE49-F238E27FC236}">
+                <a16:creationId xmlns:a16="http://schemas.microsoft.com/office/drawing/2014/main" id="{97EE74CC-84A9-43A0-B0CF-A6F21EE86027}"/>
+              </a:ext>
+            </a:extLst>
+          </p:cNvPr>
+          <p:cNvSpPr>
+            <a:spLocks noGrp="1"/>
+          </p:cNvSpPr>
+          <p:nvPr>
+            <p:ph type="body" sz="quarter" idx="3"/>
+          </p:nvPr>
+        </p:nvSpPr>
+        <p:spPr/>
+        <p:txBody>
+          <a:bodyPr/>
+          <a:lstStyle/>
+          <a:p>
+            <a:r>
+              <a:rPr lang="en-GB" dirty="0"/>
+              <a:t>Failures</a:t>
+            </a:r>
+          </a:p>
+        </p:txBody>
+      </p:sp>
+      <p:sp>
+        <p:nvSpPr>
+          <p:cNvPr id="6" name="Content Placeholder 5">
+            <a:extLst>
+              <a:ext uri="{FF2B5EF4-FFF2-40B4-BE49-F238E27FC236}">
+                <a16:creationId xmlns:a16="http://schemas.microsoft.com/office/drawing/2014/main" id="{B5129500-A132-4E3A-94B1-CC555335A7E3}"/>
+              </a:ext>
+            </a:extLst>
+          </p:cNvPr>
+          <p:cNvSpPr>
+            <a:spLocks noGrp="1"/>
+          </p:cNvSpPr>
+          <p:nvPr>
+            <p:ph sz="quarter" idx="4"/>
+          </p:nvPr>
+        </p:nvSpPr>
+        <p:spPr/>
+        <p:txBody>
+          <a:bodyPr/>
+          <a:lstStyle/>
+          <a:p>
+            <a:r>
+              <a:rPr lang="en-GB" dirty="0"/>
+              <a:t>Markdown parser</a:t>
+            </a:r>
+          </a:p>
+          <a:p>
+            <a:r>
+              <a:rPr lang="en-GB" dirty="0"/>
+              <a:t>Unit Tests</a:t>
+            </a:r>
+          </a:p>
+          <a:p>
+            <a:endParaRPr lang="en-GB" dirty="0"/>
+          </a:p>
+          <a:p>
+            <a:r>
+              <a:rPr lang="en-GB" dirty="0"/>
+              <a:t>Only realizing that my project was becoming a spaghetti monster on Thursday</a:t>
+            </a:r>
+          </a:p>
+        </p:txBody>
+      </p:sp>
+    </p:spTree>
+    <p:extLst>
+      <p:ext uri="{BB962C8B-B14F-4D97-AF65-F5344CB8AC3E}">
+        <p14:creationId xmlns:p14="http://schemas.microsoft.com/office/powerpoint/2010/main" val="1793798098"/>
+      </p:ext>
+    </p:extLst>
+  </p:cSld>
+  <p:clrMapOvr>
+    <a:masterClrMapping/>
+  </p:clrMapOvr>
+</p:sld>
+</file>
+
+<file path=ppt/slides/slide9.xml><?xml version="1.0" encoding="utf-8"?>
+<p:sld xmlns:a="http://schemas.openxmlformats.org/drawingml/2006/main" xmlns:r="http://schemas.openxmlformats.org/officeDocument/2006/relationships" xmlns:p="http://schemas.openxmlformats.org/presentationml/2006/main">
+  <p:cSld>
+    <p:spTree>
+      <p:nvGrpSpPr>
+        <p:cNvPr id="1" name=""/>
+        <p:cNvGrpSpPr/>
+        <p:nvPr/>
+      </p:nvGrpSpPr>
+      <p:grpSpPr>
+        <a:xfrm>
+          <a:off x="0" y="0"/>
+          <a:ext cx="0" cy="0"/>
+          <a:chOff x="0" y="0"/>
+          <a:chExt cx="0" cy="0"/>
+        </a:xfrm>
+      </p:grpSpPr>
+      <p:sp>
+        <p:nvSpPr>
+          <p:cNvPr id="2" name="Title 1">
+            <a:extLst>
+              <a:ext uri="{FF2B5EF4-FFF2-40B4-BE49-F238E27FC236}">
+                <a16:creationId xmlns:a16="http://schemas.microsoft.com/office/drawing/2014/main" id="{2DA6C680-EB60-4F90-B0F4-9B09B87678DF}"/>
+              </a:ext>
+            </a:extLst>
+          </p:cNvPr>
+          <p:cNvSpPr>
+            <a:spLocks noGrp="1"/>
+          </p:cNvSpPr>
+          <p:nvPr>
+            <p:ph type="title"/>
+          </p:nvPr>
+        </p:nvSpPr>
+        <p:spPr>
+          <a:xfrm>
+            <a:off x="838200" y="34885"/>
+            <a:ext cx="10515600" cy="1325563"/>
+          </a:xfrm>
+        </p:spPr>
+        <p:txBody>
+          <a:bodyPr/>
+          <a:lstStyle/>
+          <a:p>
+            <a:r>
+              <a:rPr lang="en-GB" dirty="0"/>
+              <a:t>What the program currently looks like</a:t>
+            </a:r>
+          </a:p>
+        </p:txBody>
+      </p:sp>
+      <p:pic>
+        <p:nvPicPr>
+          <p:cNvPr id="4" name="Picture 3">
+            <a:extLst>
+              <a:ext uri="{FF2B5EF4-FFF2-40B4-BE49-F238E27FC236}">
+                <a16:creationId xmlns:a16="http://schemas.microsoft.com/office/drawing/2014/main" id="{42C6B127-7E90-470C-82C9-4F08F102787A}"/>
+              </a:ext>
+            </a:extLst>
+          </p:cNvPr>
+          <p:cNvPicPr>
+            <a:picLocks noChangeAspect="1"/>
+          </p:cNvPicPr>
+          <p:nvPr/>
+        </p:nvPicPr>
+        <p:blipFill>
+          <a:blip r:embed="rId3"/>
+          <a:stretch>
+            <a:fillRect/>
+          </a:stretch>
+        </p:blipFill>
+        <p:spPr>
+          <a:xfrm>
+            <a:off x="2300476" y="1098971"/>
+            <a:ext cx="7591048" cy="5724144"/>
+          </a:xfrm>
+          <a:prstGeom prst="rect">
+            <a:avLst/>
+          </a:prstGeom>
+        </p:spPr>
+      </p:pic>
+    </p:spTree>
+    <p:extLst>
+      <p:ext uri="{BB962C8B-B14F-4D97-AF65-F5344CB8AC3E}">
+        <p14:creationId xmlns:p14="http://schemas.microsoft.com/office/powerpoint/2010/main" val="878860589"/>
       </p:ext>
     </p:extLst>
   </p:cSld>
@@ -3873,4 +7020,299 @@
     </a:ext>
   </a:extLst>
 </a:theme>
+</file>
+
+<file path=ppt/theme/theme2.xml><?xml version="1.0" encoding="utf-8"?>
+<a:theme xmlns:a="http://schemas.openxmlformats.org/drawingml/2006/main" name="Office Theme">
+  <a:themeElements>
+    <a:clrScheme name="Office">
+      <a:dk1>
+        <a:sysClr val="windowText" lastClr="000000"/>
+      </a:dk1>
+      <a:lt1>
+        <a:sysClr val="window" lastClr="FFFFFF"/>
+      </a:lt1>
+      <a:dk2>
+        <a:srgbClr val="44546A"/>
+      </a:dk2>
+      <a:lt2>
+        <a:srgbClr val="E7E6E6"/>
+      </a:lt2>
+      <a:accent1>
+        <a:srgbClr val="4472C4"/>
+      </a:accent1>
+      <a:accent2>
+        <a:srgbClr val="ED7D31"/>
+      </a:accent2>
+      <a:accent3>
+        <a:srgbClr val="A5A5A5"/>
+      </a:accent3>
+      <a:accent4>
+        <a:srgbClr val="FFC000"/>
+      </a:accent4>
+      <a:accent5>
+        <a:srgbClr val="5B9BD5"/>
+      </a:accent5>
+      <a:accent6>
+        <a:srgbClr val="70AD47"/>
+      </a:accent6>
+      <a:hlink>
+        <a:srgbClr val="0563C1"/>
+      </a:hlink>
+      <a:folHlink>
+        <a:srgbClr val="954F72"/>
+      </a:folHlink>
+    </a:clrScheme>
+    <a:fontScheme name="Office">
+      <a:majorFont>
+        <a:latin typeface="Calibri Light" panose="020F0302020204030204"/>
+        <a:ea typeface=""/>
+        <a:cs typeface=""/>
+        <a:font script="Jpan" typeface="游ゴシック Light"/>
+        <a:font script="Hang" typeface="맑은 고딕"/>
+        <a:font script="Hans" typeface="等线 Light"/>
+        <a:font script="Hant" typeface="新細明體"/>
+        <a:font script="Arab" typeface="Times New Roman"/>
+        <a:font script="Hebr" typeface="Times New Roman"/>
+        <a:font script="Thai" typeface="Angsana New"/>
+        <a:font script="Ethi" typeface="Nyala"/>
+        <a:font script="Beng" typeface="Vrinda"/>
+        <a:font script="Gujr" typeface="Shruti"/>
+        <a:font script="Khmr" typeface="MoolBoran"/>
+        <a:font script="Knda" typeface="Tunga"/>
+        <a:font script="Guru" typeface="Raavi"/>
+        <a:font script="Cans" typeface="Euphemia"/>
+        <a:font script="Cher" typeface="Plantagenet Cherokee"/>
+        <a:font script="Yiii" typeface="Microsoft Yi Baiti"/>
+        <a:font script="Tibt" typeface="Microsoft Himalaya"/>
+        <a:font script="Thaa" typeface="MV Boli"/>
+        <a:font script="Deva" typeface="Mangal"/>
+        <a:font script="Telu" typeface="Gautami"/>
+        <a:font script="Taml" typeface="Latha"/>
+        <a:font script="Syrc" typeface="Estrangelo Edessa"/>
+        <a:font script="Orya" typeface="Kalinga"/>
+        <a:font script="Mlym" typeface="Kartika"/>
+        <a:font script="Laoo" typeface="DokChampa"/>
+        <a:font script="Sinh" typeface="Iskoola Pota"/>
+        <a:font script="Mong" typeface="Mongolian Baiti"/>
+        <a:font script="Viet" typeface="Times New Roman"/>
+        <a:font script="Uigh" typeface="Microsoft Uighur"/>
+        <a:font script="Geor" typeface="Sylfaen"/>
+        <a:font script="Armn" typeface="Arial"/>
+        <a:font script="Bugi" typeface="Leelawadee UI"/>
+        <a:font script="Bopo" typeface="Microsoft JhengHei"/>
+        <a:font script="Java" typeface="Javanese Text"/>
+        <a:font script="Lisu" typeface="Segoe UI"/>
+        <a:font script="Mymr" typeface="Myanmar Text"/>
+        <a:font script="Nkoo" typeface="Ebrima"/>
+        <a:font script="Olck" typeface="Nirmala UI"/>
+        <a:font script="Osma" typeface="Ebrima"/>
+        <a:font script="Phag" typeface="Phagspa"/>
+        <a:font script="Syrn" typeface="Estrangelo Edessa"/>
+        <a:font script="Syrj" typeface="Estrangelo Edessa"/>
+        <a:font script="Syre" typeface="Estrangelo Edessa"/>
+        <a:font script="Sora" typeface="Nirmala UI"/>
+        <a:font script="Tale" typeface="Microsoft Tai Le"/>
+        <a:font script="Talu" typeface="Microsoft New Tai Lue"/>
+        <a:font script="Tfng" typeface="Ebrima"/>
+      </a:majorFont>
+      <a:minorFont>
+        <a:latin typeface="Calibri" panose="020F0502020204030204"/>
+        <a:ea typeface=""/>
+        <a:cs typeface=""/>
+        <a:font script="Jpan" typeface="游ゴシック"/>
+        <a:font script="Hang" typeface="맑은 고딕"/>
+        <a:font script="Hans" typeface="等线"/>
+        <a:font script="Hant" typeface="新細明體"/>
+        <a:font script="Arab" typeface="Arial"/>
+        <a:font script="Hebr" typeface="Arial"/>
+        <a:font script="Thai" typeface="Cordia New"/>
+        <a:font script="Ethi" typeface="Nyala"/>
+        <a:font script="Beng" typeface="Vrinda"/>
+        <a:font script="Gujr" typeface="Shruti"/>
+        <a:font script="Khmr" typeface="DaunPenh"/>
+        <a:font script="Knda" typeface="Tunga"/>
+        <a:font script="Guru" typeface="Raavi"/>
+        <a:font script="Cans" typeface="Euphemia"/>
+        <a:font script="Cher" typeface="Plantagenet Cherokee"/>
+        <a:font script="Yiii" typeface="Microsoft Yi Baiti"/>
+        <a:font script="Tibt" typeface="Microsoft Himalaya"/>
+        <a:font script="Thaa" typeface="MV Boli"/>
+        <a:font script="Deva" typeface="Mangal"/>
+        <a:font script="Telu" typeface="Gautami"/>
+        <a:font script="Taml" typeface="Latha"/>
+        <a:font script="Syrc" typeface="Estrangelo Edessa"/>
+        <a:font script="Orya" typeface="Kalinga"/>
+        <a:font script="Mlym" typeface="Kartika"/>
+        <a:font script="Laoo" typeface="DokChampa"/>
+        <a:font script="Sinh" typeface="Iskoola Pota"/>
+        <a:font script="Mong" typeface="Mongolian Baiti"/>
+        <a:font script="Viet" typeface="Arial"/>
+        <a:font script="Uigh" typeface="Microsoft Uighur"/>
+        <a:font script="Geor" typeface="Sylfaen"/>
+        <a:font script="Armn" typeface="Arial"/>
+        <a:font script="Bugi" typeface="Leelawadee UI"/>
+        <a:font script="Bopo" typeface="Microsoft JhengHei"/>
+        <a:font script="Java" typeface="Javanese Text"/>
+        <a:font script="Lisu" typeface="Segoe UI"/>
+        <a:font script="Mymr" typeface="Myanmar Text"/>
+        <a:font script="Nkoo" typeface="Ebrima"/>
+        <a:font script="Olck" typeface="Nirmala UI"/>
+        <a:font script="Osma" typeface="Ebrima"/>
+        <a:font script="Phag" typeface="Phagspa"/>
+        <a:font script="Syrn" typeface="Estrangelo Edessa"/>
+        <a:font script="Syrj" typeface="Estrangelo Edessa"/>
+        <a:font script="Syre" typeface="Estrangelo Edessa"/>
+        <a:font script="Sora" typeface="Nirmala UI"/>
+        <a:font script="Tale" typeface="Microsoft Tai Le"/>
+        <a:font script="Talu" typeface="Microsoft New Tai Lue"/>
+        <a:font script="Tfng" typeface="Ebrima"/>
+      </a:minorFont>
+    </a:fontScheme>
+    <a:fmtScheme name="Office">
+      <a:fillStyleLst>
+        <a:solidFill>
+          <a:schemeClr val="phClr"/>
+        </a:solidFill>
+        <a:gradFill rotWithShape="1">
+          <a:gsLst>
+            <a:gs pos="0">
+              <a:schemeClr val="phClr">
+                <a:lumMod val="110000"/>
+                <a:satMod val="105000"/>
+                <a:tint val="67000"/>
+              </a:schemeClr>
+            </a:gs>
+            <a:gs pos="50000">
+              <a:schemeClr val="phClr">
+                <a:lumMod val="105000"/>
+                <a:satMod val="103000"/>
+                <a:tint val="73000"/>
+              </a:schemeClr>
+            </a:gs>
+            <a:gs pos="100000">
+              <a:schemeClr val="phClr">
+                <a:lumMod val="105000"/>
+                <a:satMod val="109000"/>
+                <a:tint val="81000"/>
+              </a:schemeClr>
+            </a:gs>
+          </a:gsLst>
+          <a:lin ang="5400000" scaled="0"/>
+        </a:gradFill>
+        <a:gradFill rotWithShape="1">
+          <a:gsLst>
+            <a:gs pos="0">
+              <a:schemeClr val="phClr">
+                <a:satMod val="103000"/>
+                <a:lumMod val="102000"/>
+                <a:tint val="94000"/>
+              </a:schemeClr>
+            </a:gs>
+            <a:gs pos="50000">
+              <a:schemeClr val="phClr">
+                <a:satMod val="110000"/>
+                <a:lumMod val="100000"/>
+                <a:shade val="100000"/>
+              </a:schemeClr>
+            </a:gs>
+            <a:gs pos="100000">
+              <a:schemeClr val="phClr">
+                <a:lumMod val="99000"/>
+                <a:satMod val="120000"/>
+                <a:shade val="78000"/>
+              </a:schemeClr>
+            </a:gs>
+          </a:gsLst>
+          <a:lin ang="5400000" scaled="0"/>
+        </a:gradFill>
+      </a:fillStyleLst>
+      <a:lnStyleLst>
+        <a:ln w="6350" cap="flat" cmpd="sng" algn="ctr">
+          <a:solidFill>
+            <a:schemeClr val="phClr"/>
+          </a:solidFill>
+          <a:prstDash val="solid"/>
+          <a:miter lim="800000"/>
+        </a:ln>
+        <a:ln w="12700" cap="flat" cmpd="sng" algn="ctr">
+          <a:solidFill>
+            <a:schemeClr val="phClr"/>
+          </a:solidFill>
+          <a:prstDash val="solid"/>
+          <a:miter lim="800000"/>
+        </a:ln>
+        <a:ln w="19050" cap="flat" cmpd="sng" algn="ctr">
+          <a:solidFill>
+            <a:schemeClr val="phClr"/>
+          </a:solidFill>
+          <a:prstDash val="solid"/>
+          <a:miter lim="800000"/>
+        </a:ln>
+      </a:lnStyleLst>
+      <a:effectStyleLst>
+        <a:effectStyle>
+          <a:effectLst/>
+        </a:effectStyle>
+        <a:effectStyle>
+          <a:effectLst/>
+        </a:effectStyle>
+        <a:effectStyle>
+          <a:effectLst>
+            <a:outerShdw blurRad="57150" dist="19050" dir="5400000" algn="ctr" rotWithShape="0">
+              <a:srgbClr val="000000">
+                <a:alpha val="63000"/>
+              </a:srgbClr>
+            </a:outerShdw>
+          </a:effectLst>
+        </a:effectStyle>
+      </a:effectStyleLst>
+      <a:bgFillStyleLst>
+        <a:solidFill>
+          <a:schemeClr val="phClr"/>
+        </a:solidFill>
+        <a:solidFill>
+          <a:schemeClr val="phClr">
+            <a:tint val="95000"/>
+            <a:satMod val="170000"/>
+          </a:schemeClr>
+        </a:solidFill>
+        <a:gradFill rotWithShape="1">
+          <a:gsLst>
+            <a:gs pos="0">
+              <a:schemeClr val="phClr">
+                <a:tint val="93000"/>
+                <a:satMod val="150000"/>
+                <a:shade val="98000"/>
+                <a:lumMod val="102000"/>
+              </a:schemeClr>
+            </a:gs>
+            <a:gs pos="50000">
+              <a:schemeClr val="phClr">
+                <a:tint val="98000"/>
+                <a:satMod val="130000"/>
+                <a:shade val="90000"/>
+                <a:lumMod val="103000"/>
+              </a:schemeClr>
+            </a:gs>
+            <a:gs pos="100000">
+              <a:schemeClr val="phClr">
+                <a:shade val="63000"/>
+                <a:satMod val="120000"/>
+              </a:schemeClr>
+            </a:gs>
+          </a:gsLst>
+          <a:lin ang="5400000" scaled="0"/>
+        </a:gradFill>
+      </a:bgFillStyleLst>
+    </a:fmtScheme>
+  </a:themeElements>
+  <a:objectDefaults/>
+  <a:extraClrSchemeLst/>
+  <a:extLst>
+    <a:ext uri="{05A4C25C-085E-4340-85A3-A5531E510DB2}">
+      <thm15:themeFamily xmlns:thm15="http://schemas.microsoft.com/office/thememl/2012/main" name="Office Theme" id="{62F939B6-93AF-4DB8-9C6B-D6C7DFDC589F}" vid="{4A3C46E8-61CC-4603-A589-7422A47A8E4A}"/>
+    </a:ext>
+  </a:extLst>
+</a:theme>
 </file>
</xml_diff>

<commit_message>
basically just yeeting my deadname and a bunch of dead permalinks
</commit_message>
<xml_diff>
--- a/Reports n such/Challenge Week Presentation.pptx
+++ b/Reports n such/Challenge Week Presentation.pptx
@@ -796,7 +796,7 @@
           <a:p>
             <a:fld id="{9BC398B7-99B5-4C62-BB1D-18AAEC8B886A}" type="datetimeFigureOut">
               <a:rPr lang="en-GB" smtClean="0"/>
-              <a:t>15/10/2020</a:t>
+              <a:t>24/06/2021</a:t>
             </a:fld>
             <a:endParaRPr lang="en-GB"/>
           </a:p>
@@ -1852,7 +1852,7 @@
           <a:p>
             <a:fld id="{6ADC2AFF-0D31-422B-95FC-C81A88331D57}" type="datetimeFigureOut">
               <a:rPr lang="en-GB" smtClean="0"/>
-              <a:t>15/10/2020</a:t>
+              <a:t>24/06/2021</a:t>
             </a:fld>
             <a:endParaRPr lang="en-GB"/>
           </a:p>
@@ -2052,7 +2052,7 @@
           <a:p>
             <a:fld id="{6ADC2AFF-0D31-422B-95FC-C81A88331D57}" type="datetimeFigureOut">
               <a:rPr lang="en-GB" smtClean="0"/>
-              <a:t>15/10/2020</a:t>
+              <a:t>24/06/2021</a:t>
             </a:fld>
             <a:endParaRPr lang="en-GB"/>
           </a:p>
@@ -2262,7 +2262,7 @@
           <a:p>
             <a:fld id="{6ADC2AFF-0D31-422B-95FC-C81A88331D57}" type="datetimeFigureOut">
               <a:rPr lang="en-GB" smtClean="0"/>
-              <a:t>15/10/2020</a:t>
+              <a:t>24/06/2021</a:t>
             </a:fld>
             <a:endParaRPr lang="en-GB"/>
           </a:p>
@@ -2462,7 +2462,7 @@
           <a:p>
             <a:fld id="{6ADC2AFF-0D31-422B-95FC-C81A88331D57}" type="datetimeFigureOut">
               <a:rPr lang="en-GB" smtClean="0"/>
-              <a:t>15/10/2020</a:t>
+              <a:t>24/06/2021</a:t>
             </a:fld>
             <a:endParaRPr lang="en-GB"/>
           </a:p>
@@ -2738,7 +2738,7 @@
           <a:p>
             <a:fld id="{6ADC2AFF-0D31-422B-95FC-C81A88331D57}" type="datetimeFigureOut">
               <a:rPr lang="en-GB" smtClean="0"/>
-              <a:t>15/10/2020</a:t>
+              <a:t>24/06/2021</a:t>
             </a:fld>
             <a:endParaRPr lang="en-GB"/>
           </a:p>
@@ -3006,7 +3006,7 @@
           <a:p>
             <a:fld id="{6ADC2AFF-0D31-422B-95FC-C81A88331D57}" type="datetimeFigureOut">
               <a:rPr lang="en-GB" smtClean="0"/>
-              <a:t>15/10/2020</a:t>
+              <a:t>24/06/2021</a:t>
             </a:fld>
             <a:endParaRPr lang="en-GB"/>
           </a:p>
@@ -3421,7 +3421,7 @@
           <a:p>
             <a:fld id="{6ADC2AFF-0D31-422B-95FC-C81A88331D57}" type="datetimeFigureOut">
               <a:rPr lang="en-GB" smtClean="0"/>
-              <a:t>15/10/2020</a:t>
+              <a:t>24/06/2021</a:t>
             </a:fld>
             <a:endParaRPr lang="en-GB"/>
           </a:p>
@@ -3563,7 +3563,7 @@
           <a:p>
             <a:fld id="{6ADC2AFF-0D31-422B-95FC-C81A88331D57}" type="datetimeFigureOut">
               <a:rPr lang="en-GB" smtClean="0"/>
-              <a:t>15/10/2020</a:t>
+              <a:t>24/06/2021</a:t>
             </a:fld>
             <a:endParaRPr lang="en-GB"/>
           </a:p>
@@ -3676,7 +3676,7 @@
           <a:p>
             <a:fld id="{6ADC2AFF-0D31-422B-95FC-C81A88331D57}" type="datetimeFigureOut">
               <a:rPr lang="en-GB" smtClean="0"/>
-              <a:t>15/10/2020</a:t>
+              <a:t>24/06/2021</a:t>
             </a:fld>
             <a:endParaRPr lang="en-GB"/>
           </a:p>
@@ -3989,7 +3989,7 @@
           <a:p>
             <a:fld id="{6ADC2AFF-0D31-422B-95FC-C81A88331D57}" type="datetimeFigureOut">
               <a:rPr lang="en-GB" smtClean="0"/>
-              <a:t>15/10/2020</a:t>
+              <a:t>24/06/2021</a:t>
             </a:fld>
             <a:endParaRPr lang="en-GB"/>
           </a:p>
@@ -4278,7 +4278,7 @@
           <a:p>
             <a:fld id="{6ADC2AFF-0D31-422B-95FC-C81A88331D57}" type="datetimeFigureOut">
               <a:rPr lang="en-GB" smtClean="0"/>
-              <a:t>15/10/2020</a:t>
+              <a:t>24/06/2021</a:t>
             </a:fld>
             <a:endParaRPr lang="en-GB"/>
           </a:p>
@@ -4521,7 +4521,7 @@
           <a:p>
             <a:fld id="{6ADC2AFF-0D31-422B-95FC-C81A88331D57}" type="datetimeFigureOut">
               <a:rPr lang="en-GB" smtClean="0"/>
-              <a:t>15/10/2020</a:t>
+              <a:t>24/06/2021</a:t>
             </a:fld>
             <a:endParaRPr lang="en-GB"/>
           </a:p>
@@ -5005,7 +5005,7 @@
           <a:p>
             <a:r>
               <a:rPr lang="en-GB" dirty="0"/>
-              <a:t>R. Lowe (1804170)</a:t>
+              <a:t>Rachel Lowe (1804170)</a:t>
             </a:r>
           </a:p>
         </p:txBody>

</xml_diff>